<commit_message>
sending week 11 and week 10 assignment update
</commit_message>
<xml_diff>
--- a/lectures/ex6_rev_distributions.pptx
+++ b/lectures/ex6_rev_distributions.pptx
@@ -4,9 +4,12 @@
   <p:sldMasterIdLst>
     <p:sldMasterId id="2147483648" r:id="rId1"/>
   </p:sldMasterIdLst>
+  <p:notesMasterIdLst>
+    <p:notesMasterId r:id="rId7"/>
+  </p:notesMasterIdLst>
   <p:sldIdLst>
     <p:sldId id="256" r:id="rId2"/>
-    <p:sldId id="260" r:id="rId3"/>
+    <p:sldId id="283" r:id="rId3"/>
     <p:sldId id="258" r:id="rId4"/>
     <p:sldId id="259" r:id="rId5"/>
     <p:sldId id="257" r:id="rId6"/>
@@ -116,6 +119,439 @@
 </p:presentation>
 </file>
 
+<file path=ppt/notesMasters/notesMaster1.xml><?xml version="1.0" encoding="utf-8"?>
+<p:notesMaster xmlns:a="http://schemas.openxmlformats.org/drawingml/2006/main" xmlns:r="http://schemas.openxmlformats.org/officeDocument/2006/relationships" xmlns:p="http://schemas.openxmlformats.org/presentationml/2006/main">
+  <p:cSld>
+    <p:bg>
+      <p:bgRef idx="1001">
+        <a:schemeClr val="bg1"/>
+      </p:bgRef>
+    </p:bg>
+    <p:spTree>
+      <p:nvGrpSpPr>
+        <p:cNvPr id="1" name=""/>
+        <p:cNvGrpSpPr/>
+        <p:nvPr/>
+      </p:nvGrpSpPr>
+      <p:grpSpPr>
+        <a:xfrm>
+          <a:off x="0" y="0"/>
+          <a:ext cx="0" cy="0"/>
+          <a:chOff x="0" y="0"/>
+          <a:chExt cx="0" cy="0"/>
+        </a:xfrm>
+      </p:grpSpPr>
+      <p:sp>
+        <p:nvSpPr>
+          <p:cNvPr id="2" name="Header Placeholder 1"/>
+          <p:cNvSpPr>
+            <a:spLocks noGrp="1"/>
+          </p:cNvSpPr>
+          <p:nvPr>
+            <p:ph type="hdr" sz="quarter"/>
+          </p:nvPr>
+        </p:nvSpPr>
+        <p:spPr>
+          <a:xfrm>
+            <a:off x="0" y="0"/>
+            <a:ext cx="2971800" cy="458788"/>
+          </a:xfrm>
+          <a:prstGeom prst="rect">
+            <a:avLst/>
+          </a:prstGeom>
+        </p:spPr>
+        <p:txBody>
+          <a:bodyPr vert="horz" lIns="91440" tIns="45720" rIns="91440" bIns="45720" rtlCol="0"/>
+          <a:lstStyle>
+            <a:lvl1pPr algn="l">
+              <a:defRPr sz="1200"/>
+            </a:lvl1pPr>
+          </a:lstStyle>
+          <a:p>
+            <a:endParaRPr lang="en-US"/>
+          </a:p>
+        </p:txBody>
+      </p:sp>
+      <p:sp>
+        <p:nvSpPr>
+          <p:cNvPr id="3" name="Date Placeholder 2"/>
+          <p:cNvSpPr>
+            <a:spLocks noGrp="1"/>
+          </p:cNvSpPr>
+          <p:nvPr>
+            <p:ph type="dt" idx="1"/>
+          </p:nvPr>
+        </p:nvSpPr>
+        <p:spPr>
+          <a:xfrm>
+            <a:off x="3884613" y="0"/>
+            <a:ext cx="2971800" cy="458788"/>
+          </a:xfrm>
+          <a:prstGeom prst="rect">
+            <a:avLst/>
+          </a:prstGeom>
+        </p:spPr>
+        <p:txBody>
+          <a:bodyPr vert="horz" lIns="91440" tIns="45720" rIns="91440" bIns="45720" rtlCol="0"/>
+          <a:lstStyle>
+            <a:lvl1pPr algn="r">
+              <a:defRPr sz="1200"/>
+            </a:lvl1pPr>
+          </a:lstStyle>
+          <a:p>
+            <a:fld id="{B16F72E9-376B-FB40-B6A5-33EF34EDADFB}" type="datetimeFigureOut">
+              <a:rPr lang="en-US" smtClean="0"/>
+              <a:t>2/28/19</a:t>
+            </a:fld>
+            <a:endParaRPr lang="en-US"/>
+          </a:p>
+        </p:txBody>
+      </p:sp>
+      <p:sp>
+        <p:nvSpPr>
+          <p:cNvPr id="4" name="Slide Image Placeholder 3"/>
+          <p:cNvSpPr>
+            <a:spLocks noGrp="1" noRot="1" noChangeAspect="1"/>
+          </p:cNvSpPr>
+          <p:nvPr>
+            <p:ph type="sldImg" idx="2"/>
+          </p:nvPr>
+        </p:nvSpPr>
+        <p:spPr>
+          <a:xfrm>
+            <a:off x="685800" y="1143000"/>
+            <a:ext cx="5486400" cy="3086100"/>
+          </a:xfrm>
+          <a:prstGeom prst="rect">
+            <a:avLst/>
+          </a:prstGeom>
+          <a:noFill/>
+          <a:ln w="12700">
+            <a:solidFill>
+              <a:prstClr val="black"/>
+            </a:solidFill>
+          </a:ln>
+        </p:spPr>
+        <p:txBody>
+          <a:bodyPr vert="horz" lIns="91440" tIns="45720" rIns="91440" bIns="45720" rtlCol="0" anchor="ctr"/>
+          <a:lstStyle/>
+          <a:p>
+            <a:endParaRPr lang="en-US"/>
+          </a:p>
+        </p:txBody>
+      </p:sp>
+      <p:sp>
+        <p:nvSpPr>
+          <p:cNvPr id="5" name="Notes Placeholder 4"/>
+          <p:cNvSpPr>
+            <a:spLocks noGrp="1"/>
+          </p:cNvSpPr>
+          <p:nvPr>
+            <p:ph type="body" sz="quarter" idx="3"/>
+          </p:nvPr>
+        </p:nvSpPr>
+        <p:spPr>
+          <a:xfrm>
+            <a:off x="685800" y="4400550"/>
+            <a:ext cx="5486400" cy="3600450"/>
+          </a:xfrm>
+          <a:prstGeom prst="rect">
+            <a:avLst/>
+          </a:prstGeom>
+        </p:spPr>
+        <p:txBody>
+          <a:bodyPr vert="horz" lIns="91440" tIns="45720" rIns="91440" bIns="45720" rtlCol="0"/>
+          <a:lstStyle/>
+          <a:p>
+            <a:pPr lvl="0"/>
+            <a:r>
+              <a:rPr lang="en-US"/>
+              <a:t>Edit Master text styles</a:t>
+            </a:r>
+          </a:p>
+          <a:p>
+            <a:pPr lvl="1"/>
+            <a:r>
+              <a:rPr lang="en-US"/>
+              <a:t>Second level</a:t>
+            </a:r>
+          </a:p>
+          <a:p>
+            <a:pPr lvl="2"/>
+            <a:r>
+              <a:rPr lang="en-US"/>
+              <a:t>Third level</a:t>
+            </a:r>
+          </a:p>
+          <a:p>
+            <a:pPr lvl="3"/>
+            <a:r>
+              <a:rPr lang="en-US"/>
+              <a:t>Fourth level</a:t>
+            </a:r>
+          </a:p>
+          <a:p>
+            <a:pPr lvl="4"/>
+            <a:r>
+              <a:rPr lang="en-US"/>
+              <a:t>Fifth level</a:t>
+            </a:r>
+          </a:p>
+        </p:txBody>
+      </p:sp>
+      <p:sp>
+        <p:nvSpPr>
+          <p:cNvPr id="6" name="Footer Placeholder 5"/>
+          <p:cNvSpPr>
+            <a:spLocks noGrp="1"/>
+          </p:cNvSpPr>
+          <p:nvPr>
+            <p:ph type="ftr" sz="quarter" idx="4"/>
+          </p:nvPr>
+        </p:nvSpPr>
+        <p:spPr>
+          <a:xfrm>
+            <a:off x="0" y="8685213"/>
+            <a:ext cx="2971800" cy="458787"/>
+          </a:xfrm>
+          <a:prstGeom prst="rect">
+            <a:avLst/>
+          </a:prstGeom>
+        </p:spPr>
+        <p:txBody>
+          <a:bodyPr vert="horz" lIns="91440" tIns="45720" rIns="91440" bIns="45720" rtlCol="0" anchor="b"/>
+          <a:lstStyle>
+            <a:lvl1pPr algn="l">
+              <a:defRPr sz="1200"/>
+            </a:lvl1pPr>
+          </a:lstStyle>
+          <a:p>
+            <a:endParaRPr lang="en-US"/>
+          </a:p>
+        </p:txBody>
+      </p:sp>
+      <p:sp>
+        <p:nvSpPr>
+          <p:cNvPr id="7" name="Slide Number Placeholder 6"/>
+          <p:cNvSpPr>
+            <a:spLocks noGrp="1"/>
+          </p:cNvSpPr>
+          <p:nvPr>
+            <p:ph type="sldNum" sz="quarter" idx="5"/>
+          </p:nvPr>
+        </p:nvSpPr>
+        <p:spPr>
+          <a:xfrm>
+            <a:off x="3884613" y="8685213"/>
+            <a:ext cx="2971800" cy="458787"/>
+          </a:xfrm>
+          <a:prstGeom prst="rect">
+            <a:avLst/>
+          </a:prstGeom>
+        </p:spPr>
+        <p:txBody>
+          <a:bodyPr vert="horz" lIns="91440" tIns="45720" rIns="91440" bIns="45720" rtlCol="0" anchor="b"/>
+          <a:lstStyle>
+            <a:lvl1pPr algn="r">
+              <a:defRPr sz="1200"/>
+            </a:lvl1pPr>
+          </a:lstStyle>
+          <a:p>
+            <a:fld id="{171DB108-7602-D640-AF68-3B04CD2A9AFF}" type="slidenum">
+              <a:rPr lang="en-US" smtClean="0"/>
+              <a:t>‹#›</a:t>
+            </a:fld>
+            <a:endParaRPr lang="en-US"/>
+          </a:p>
+        </p:txBody>
+      </p:sp>
+    </p:spTree>
+    <p:extLst>
+      <p:ext uri="{BB962C8B-B14F-4D97-AF65-F5344CB8AC3E}">
+        <p14:creationId xmlns:p14="http://schemas.microsoft.com/office/powerpoint/2010/main" val="4212716223"/>
+      </p:ext>
+    </p:extLst>
+  </p:cSld>
+  <p:clrMap bg1="lt1" tx1="dk1" bg2="lt2" tx2="dk2" accent1="accent1" accent2="accent2" accent3="accent3" accent4="accent4" accent5="accent5" accent6="accent6" hlink="hlink" folHlink="folHlink"/>
+  <p:notesStyle>
+    <a:lvl1pPr marL="0" algn="l" defTabSz="914400" rtl="0" eaLnBrk="1" latinLnBrk="0" hangingPunct="1">
+      <a:defRPr sz="1200" kern="1200">
+        <a:solidFill>
+          <a:schemeClr val="tx1"/>
+        </a:solidFill>
+        <a:latin typeface="+mn-lt"/>
+        <a:ea typeface="+mn-ea"/>
+        <a:cs typeface="+mn-cs"/>
+      </a:defRPr>
+    </a:lvl1pPr>
+    <a:lvl2pPr marL="457200" algn="l" defTabSz="914400" rtl="0" eaLnBrk="1" latinLnBrk="0" hangingPunct="1">
+      <a:defRPr sz="1200" kern="1200">
+        <a:solidFill>
+          <a:schemeClr val="tx1"/>
+        </a:solidFill>
+        <a:latin typeface="+mn-lt"/>
+        <a:ea typeface="+mn-ea"/>
+        <a:cs typeface="+mn-cs"/>
+      </a:defRPr>
+    </a:lvl2pPr>
+    <a:lvl3pPr marL="914400" algn="l" defTabSz="914400" rtl="0" eaLnBrk="1" latinLnBrk="0" hangingPunct="1">
+      <a:defRPr sz="1200" kern="1200">
+        <a:solidFill>
+          <a:schemeClr val="tx1"/>
+        </a:solidFill>
+        <a:latin typeface="+mn-lt"/>
+        <a:ea typeface="+mn-ea"/>
+        <a:cs typeface="+mn-cs"/>
+      </a:defRPr>
+    </a:lvl3pPr>
+    <a:lvl4pPr marL="1371600" algn="l" defTabSz="914400" rtl="0" eaLnBrk="1" latinLnBrk="0" hangingPunct="1">
+      <a:defRPr sz="1200" kern="1200">
+        <a:solidFill>
+          <a:schemeClr val="tx1"/>
+        </a:solidFill>
+        <a:latin typeface="+mn-lt"/>
+        <a:ea typeface="+mn-ea"/>
+        <a:cs typeface="+mn-cs"/>
+      </a:defRPr>
+    </a:lvl4pPr>
+    <a:lvl5pPr marL="1828800" algn="l" defTabSz="914400" rtl="0" eaLnBrk="1" latinLnBrk="0" hangingPunct="1">
+      <a:defRPr sz="1200" kern="1200">
+        <a:solidFill>
+          <a:schemeClr val="tx1"/>
+        </a:solidFill>
+        <a:latin typeface="+mn-lt"/>
+        <a:ea typeface="+mn-ea"/>
+        <a:cs typeface="+mn-cs"/>
+      </a:defRPr>
+    </a:lvl5pPr>
+    <a:lvl6pPr marL="2286000" algn="l" defTabSz="914400" rtl="0" eaLnBrk="1" latinLnBrk="0" hangingPunct="1">
+      <a:defRPr sz="1200" kern="1200">
+        <a:solidFill>
+          <a:schemeClr val="tx1"/>
+        </a:solidFill>
+        <a:latin typeface="+mn-lt"/>
+        <a:ea typeface="+mn-ea"/>
+        <a:cs typeface="+mn-cs"/>
+      </a:defRPr>
+    </a:lvl6pPr>
+    <a:lvl7pPr marL="2743200" algn="l" defTabSz="914400" rtl="0" eaLnBrk="1" latinLnBrk="0" hangingPunct="1">
+      <a:defRPr sz="1200" kern="1200">
+        <a:solidFill>
+          <a:schemeClr val="tx1"/>
+        </a:solidFill>
+        <a:latin typeface="+mn-lt"/>
+        <a:ea typeface="+mn-ea"/>
+        <a:cs typeface="+mn-cs"/>
+      </a:defRPr>
+    </a:lvl7pPr>
+    <a:lvl8pPr marL="3200400" algn="l" defTabSz="914400" rtl="0" eaLnBrk="1" latinLnBrk="0" hangingPunct="1">
+      <a:defRPr sz="1200" kern="1200">
+        <a:solidFill>
+          <a:schemeClr val="tx1"/>
+        </a:solidFill>
+        <a:latin typeface="+mn-lt"/>
+        <a:ea typeface="+mn-ea"/>
+        <a:cs typeface="+mn-cs"/>
+      </a:defRPr>
+    </a:lvl8pPr>
+    <a:lvl9pPr marL="3657600" algn="l" defTabSz="914400" rtl="0" eaLnBrk="1" latinLnBrk="0" hangingPunct="1">
+      <a:defRPr sz="1200" kern="1200">
+        <a:solidFill>
+          <a:schemeClr val="tx1"/>
+        </a:solidFill>
+        <a:latin typeface="+mn-lt"/>
+        <a:ea typeface="+mn-ea"/>
+        <a:cs typeface="+mn-cs"/>
+      </a:defRPr>
+    </a:lvl9pPr>
+  </p:notesStyle>
+</p:notesMaster>
+</file>
+
+<file path=ppt/notesSlides/notesSlide1.xml><?xml version="1.0" encoding="utf-8"?>
+<p:notes xmlns:a="http://schemas.openxmlformats.org/drawingml/2006/main" xmlns:r="http://schemas.openxmlformats.org/officeDocument/2006/relationships" xmlns:p="http://schemas.openxmlformats.org/presentationml/2006/main">
+  <p:cSld>
+    <p:spTree>
+      <p:nvGrpSpPr>
+        <p:cNvPr id="1" name=""/>
+        <p:cNvGrpSpPr/>
+        <p:nvPr/>
+      </p:nvGrpSpPr>
+      <p:grpSpPr>
+        <a:xfrm>
+          <a:off x="0" y="0"/>
+          <a:ext cx="0" cy="0"/>
+          <a:chOff x="0" y="0"/>
+          <a:chExt cx="0" cy="0"/>
+        </a:xfrm>
+      </p:grpSpPr>
+      <p:sp>
+        <p:nvSpPr>
+          <p:cNvPr id="2" name="Slide Image Placeholder 1"/>
+          <p:cNvSpPr>
+            <a:spLocks noGrp="1" noRot="1" noChangeAspect="1"/>
+          </p:cNvSpPr>
+          <p:nvPr>
+            <p:ph type="sldImg"/>
+          </p:nvPr>
+        </p:nvSpPr>
+        <p:spPr/>
+      </p:sp>
+      <p:sp>
+        <p:nvSpPr>
+          <p:cNvPr id="3" name="Notes Placeholder 2"/>
+          <p:cNvSpPr>
+            <a:spLocks noGrp="1"/>
+          </p:cNvSpPr>
+          <p:nvPr>
+            <p:ph type="body" idx="1"/>
+          </p:nvPr>
+        </p:nvSpPr>
+        <p:spPr/>
+        <p:txBody>
+          <a:bodyPr/>
+          <a:lstStyle/>
+          <a:p>
+            <a:endParaRPr lang="en-US" dirty="0"/>
+          </a:p>
+        </p:txBody>
+      </p:sp>
+      <p:sp>
+        <p:nvSpPr>
+          <p:cNvPr id="4" name="Slide Number Placeholder 3"/>
+          <p:cNvSpPr>
+            <a:spLocks noGrp="1"/>
+          </p:cNvSpPr>
+          <p:nvPr>
+            <p:ph type="sldNum" sz="quarter" idx="5"/>
+          </p:nvPr>
+        </p:nvSpPr>
+        <p:spPr/>
+        <p:txBody>
+          <a:bodyPr/>
+          <a:lstStyle/>
+          <a:p>
+            <a:fld id="{AB338687-A7AF-CA41-9DA3-11909A50B352}" type="slidenum">
+              <a:rPr lang="en-US" smtClean="0"/>
+              <a:t>2</a:t>
+            </a:fld>
+            <a:endParaRPr lang="en-US"/>
+          </a:p>
+        </p:txBody>
+      </p:sp>
+    </p:spTree>
+    <p:extLst>
+      <p:ext uri="{BB962C8B-B14F-4D97-AF65-F5344CB8AC3E}">
+        <p14:creationId xmlns:p14="http://schemas.microsoft.com/office/powerpoint/2010/main" val="868076646"/>
+      </p:ext>
+    </p:extLst>
+  </p:cSld>
+  <p:clrMapOvr>
+    <a:masterClrMapping/>
+  </p:clrMapOvr>
+</p:notes>
+</file>
+
 <file path=ppt/slideLayouts/slideLayout1.xml><?xml version="1.0" encoding="utf-8"?>
 <p:sldLayout xmlns:a="http://schemas.openxmlformats.org/drawingml/2006/main" xmlns:r="http://schemas.openxmlformats.org/officeDocument/2006/relationships" xmlns:p="http://schemas.openxmlformats.org/presentationml/2006/main" type="title" preserve="1">
   <p:cSld name="Title Slide">
@@ -158,10 +594,9 @@
           </a:lstStyle>
           <a:p>
             <a:r>
-              <a:rPr lang="en-US" smtClean="0"/>
+              <a:rPr lang="en-US"/>
               <a:t>Click to edit Master title style</a:t>
             </a:r>
-            <a:endParaRPr lang="en-US"/>
           </a:p>
         </p:txBody>
       </p:sp>
@@ -223,10 +658,9 @@
           </a:lstStyle>
           <a:p>
             <a:r>
-              <a:rPr lang="en-US" smtClean="0"/>
+              <a:rPr lang="en-US"/>
               <a:t>Click to edit Master subtitle style</a:t>
             </a:r>
-            <a:endParaRPr lang="en-US"/>
           </a:p>
         </p:txBody>
       </p:sp>
@@ -247,7 +681,7 @@
           <a:p>
             <a:fld id="{3DA3D352-7221-F147-996D-DAA8FC8F9D40}" type="datetimeFigureOut">
               <a:rPr lang="en-US" smtClean="0"/>
-              <a:t>3/22/18</a:t>
+              <a:t>2/28/19</a:t>
             </a:fld>
             <a:endParaRPr lang="en-US"/>
           </a:p>
@@ -341,10 +775,9 @@
           <a:lstStyle/>
           <a:p>
             <a:r>
-              <a:rPr lang="en-US" smtClean="0"/>
+              <a:rPr lang="en-US"/>
               <a:t>Click to edit Master title style</a:t>
             </a:r>
-            <a:endParaRPr lang="en-US"/>
           </a:p>
         </p:txBody>
       </p:sp>
@@ -365,38 +798,37 @@
           <a:p>
             <a:pPr lvl="0"/>
             <a:r>
-              <a:rPr lang="en-US" smtClean="0"/>
+              <a:rPr lang="en-US"/>
               <a:t>Click to edit Master text styles</a:t>
             </a:r>
           </a:p>
           <a:p>
             <a:pPr lvl="1"/>
             <a:r>
-              <a:rPr lang="en-US" smtClean="0"/>
+              <a:rPr lang="en-US"/>
               <a:t>Second level</a:t>
             </a:r>
           </a:p>
           <a:p>
             <a:pPr lvl="2"/>
             <a:r>
-              <a:rPr lang="en-US" smtClean="0"/>
+              <a:rPr lang="en-US"/>
               <a:t>Third level</a:t>
             </a:r>
           </a:p>
           <a:p>
             <a:pPr lvl="3"/>
             <a:r>
-              <a:rPr lang="en-US" smtClean="0"/>
+              <a:rPr lang="en-US"/>
               <a:t>Fourth level</a:t>
             </a:r>
           </a:p>
           <a:p>
             <a:pPr lvl="4"/>
             <a:r>
-              <a:rPr lang="en-US" smtClean="0"/>
+              <a:rPr lang="en-US"/>
               <a:t>Fifth level</a:t>
             </a:r>
-            <a:endParaRPr lang="en-US"/>
           </a:p>
         </p:txBody>
       </p:sp>
@@ -417,7 +849,7 @@
           <a:p>
             <a:fld id="{3DA3D352-7221-F147-996D-DAA8FC8F9D40}" type="datetimeFigureOut">
               <a:rPr lang="en-US" smtClean="0"/>
-              <a:t>3/22/18</a:t>
+              <a:t>2/28/19</a:t>
             </a:fld>
             <a:endParaRPr lang="en-US"/>
           </a:p>
@@ -516,10 +948,9 @@
           <a:lstStyle/>
           <a:p>
             <a:r>
-              <a:rPr lang="en-US" smtClean="0"/>
+              <a:rPr lang="en-US"/>
               <a:t>Click to edit Master title style</a:t>
             </a:r>
-            <a:endParaRPr lang="en-US"/>
           </a:p>
         </p:txBody>
       </p:sp>
@@ -545,38 +976,37 @@
           <a:p>
             <a:pPr lvl="0"/>
             <a:r>
-              <a:rPr lang="en-US" smtClean="0"/>
+              <a:rPr lang="en-US"/>
               <a:t>Click to edit Master text styles</a:t>
             </a:r>
           </a:p>
           <a:p>
             <a:pPr lvl="1"/>
             <a:r>
-              <a:rPr lang="en-US" smtClean="0"/>
+              <a:rPr lang="en-US"/>
               <a:t>Second level</a:t>
             </a:r>
           </a:p>
           <a:p>
             <a:pPr lvl="2"/>
             <a:r>
-              <a:rPr lang="en-US" smtClean="0"/>
+              <a:rPr lang="en-US"/>
               <a:t>Third level</a:t>
             </a:r>
           </a:p>
           <a:p>
             <a:pPr lvl="3"/>
             <a:r>
-              <a:rPr lang="en-US" smtClean="0"/>
+              <a:rPr lang="en-US"/>
               <a:t>Fourth level</a:t>
             </a:r>
           </a:p>
           <a:p>
             <a:pPr lvl="4"/>
             <a:r>
-              <a:rPr lang="en-US" smtClean="0"/>
+              <a:rPr lang="en-US"/>
               <a:t>Fifth level</a:t>
             </a:r>
-            <a:endParaRPr lang="en-US"/>
           </a:p>
         </p:txBody>
       </p:sp>
@@ -597,7 +1027,7 @@
           <a:p>
             <a:fld id="{3DA3D352-7221-F147-996D-DAA8FC8F9D40}" type="datetimeFigureOut">
               <a:rPr lang="en-US" smtClean="0"/>
-              <a:t>3/22/18</a:t>
+              <a:t>2/28/19</a:t>
             </a:fld>
             <a:endParaRPr lang="en-US"/>
           </a:p>
@@ -691,10 +1121,9 @@
           <a:lstStyle/>
           <a:p>
             <a:r>
-              <a:rPr lang="en-US" smtClean="0"/>
+              <a:rPr lang="en-US"/>
               <a:t>Click to edit Master title style</a:t>
             </a:r>
-            <a:endParaRPr lang="en-US"/>
           </a:p>
         </p:txBody>
       </p:sp>
@@ -715,38 +1144,37 @@
           <a:p>
             <a:pPr lvl="0"/>
             <a:r>
-              <a:rPr lang="en-US" smtClean="0"/>
+              <a:rPr lang="en-US"/>
               <a:t>Click to edit Master text styles</a:t>
             </a:r>
           </a:p>
           <a:p>
             <a:pPr lvl="1"/>
             <a:r>
-              <a:rPr lang="en-US" smtClean="0"/>
+              <a:rPr lang="en-US"/>
               <a:t>Second level</a:t>
             </a:r>
           </a:p>
           <a:p>
             <a:pPr lvl="2"/>
             <a:r>
-              <a:rPr lang="en-US" smtClean="0"/>
+              <a:rPr lang="en-US"/>
               <a:t>Third level</a:t>
             </a:r>
           </a:p>
           <a:p>
             <a:pPr lvl="3"/>
             <a:r>
-              <a:rPr lang="en-US" smtClean="0"/>
+              <a:rPr lang="en-US"/>
               <a:t>Fourth level</a:t>
             </a:r>
           </a:p>
           <a:p>
             <a:pPr lvl="4"/>
             <a:r>
-              <a:rPr lang="en-US" smtClean="0"/>
+              <a:rPr lang="en-US"/>
               <a:t>Fifth level</a:t>
             </a:r>
-            <a:endParaRPr lang="en-US"/>
           </a:p>
         </p:txBody>
       </p:sp>
@@ -767,7 +1195,7 @@
           <a:p>
             <a:fld id="{3DA3D352-7221-F147-996D-DAA8FC8F9D40}" type="datetimeFigureOut">
               <a:rPr lang="en-US" smtClean="0"/>
-              <a:t>3/22/18</a:t>
+              <a:t>2/28/19</a:t>
             </a:fld>
             <a:endParaRPr lang="en-US"/>
           </a:p>
@@ -870,10 +1298,9 @@
           </a:lstStyle>
           <a:p>
             <a:r>
-              <a:rPr lang="en-US" smtClean="0"/>
+              <a:rPr lang="en-US"/>
               <a:t>Click to edit Master title style</a:t>
             </a:r>
-            <a:endParaRPr lang="en-US"/>
           </a:p>
         </p:txBody>
       </p:sp>
@@ -990,7 +1417,7 @@
           <a:p>
             <a:pPr lvl="0"/>
             <a:r>
-              <a:rPr lang="en-US" smtClean="0"/>
+              <a:rPr lang="en-US"/>
               <a:t>Click to edit Master text styles</a:t>
             </a:r>
           </a:p>
@@ -1013,7 +1440,7 @@
           <a:p>
             <a:fld id="{3DA3D352-7221-F147-996D-DAA8FC8F9D40}" type="datetimeFigureOut">
               <a:rPr lang="en-US" smtClean="0"/>
-              <a:t>3/22/18</a:t>
+              <a:t>2/28/19</a:t>
             </a:fld>
             <a:endParaRPr lang="en-US"/>
           </a:p>
@@ -1107,10 +1534,9 @@
           <a:lstStyle/>
           <a:p>
             <a:r>
-              <a:rPr lang="en-US" smtClean="0"/>
+              <a:rPr lang="en-US"/>
               <a:t>Click to edit Master title style</a:t>
             </a:r>
-            <a:endParaRPr lang="en-US"/>
           </a:p>
         </p:txBody>
       </p:sp>
@@ -1136,38 +1562,37 @@
           <a:p>
             <a:pPr lvl="0"/>
             <a:r>
-              <a:rPr lang="en-US" smtClean="0"/>
+              <a:rPr lang="en-US"/>
               <a:t>Click to edit Master text styles</a:t>
             </a:r>
           </a:p>
           <a:p>
             <a:pPr lvl="1"/>
             <a:r>
-              <a:rPr lang="en-US" smtClean="0"/>
+              <a:rPr lang="en-US"/>
               <a:t>Second level</a:t>
             </a:r>
           </a:p>
           <a:p>
             <a:pPr lvl="2"/>
             <a:r>
-              <a:rPr lang="en-US" smtClean="0"/>
+              <a:rPr lang="en-US"/>
               <a:t>Third level</a:t>
             </a:r>
           </a:p>
           <a:p>
             <a:pPr lvl="3"/>
             <a:r>
-              <a:rPr lang="en-US" smtClean="0"/>
+              <a:rPr lang="en-US"/>
               <a:t>Fourth level</a:t>
             </a:r>
           </a:p>
           <a:p>
             <a:pPr lvl="4"/>
             <a:r>
-              <a:rPr lang="en-US" smtClean="0"/>
+              <a:rPr lang="en-US"/>
               <a:t>Fifth level</a:t>
             </a:r>
-            <a:endParaRPr lang="en-US"/>
           </a:p>
         </p:txBody>
       </p:sp>
@@ -1193,38 +1618,37 @@
           <a:p>
             <a:pPr lvl="0"/>
             <a:r>
-              <a:rPr lang="en-US" smtClean="0"/>
+              <a:rPr lang="en-US"/>
               <a:t>Click to edit Master text styles</a:t>
             </a:r>
           </a:p>
           <a:p>
             <a:pPr lvl="1"/>
             <a:r>
-              <a:rPr lang="en-US" smtClean="0"/>
+              <a:rPr lang="en-US"/>
               <a:t>Second level</a:t>
             </a:r>
           </a:p>
           <a:p>
             <a:pPr lvl="2"/>
             <a:r>
-              <a:rPr lang="en-US" smtClean="0"/>
+              <a:rPr lang="en-US"/>
               <a:t>Third level</a:t>
             </a:r>
           </a:p>
           <a:p>
             <a:pPr lvl="3"/>
             <a:r>
-              <a:rPr lang="en-US" smtClean="0"/>
+              <a:rPr lang="en-US"/>
               <a:t>Fourth level</a:t>
             </a:r>
           </a:p>
           <a:p>
             <a:pPr lvl="4"/>
             <a:r>
-              <a:rPr lang="en-US" smtClean="0"/>
+              <a:rPr lang="en-US"/>
               <a:t>Fifth level</a:t>
             </a:r>
-            <a:endParaRPr lang="en-US"/>
           </a:p>
         </p:txBody>
       </p:sp>
@@ -1245,7 +1669,7 @@
           <a:p>
             <a:fld id="{3DA3D352-7221-F147-996D-DAA8FC8F9D40}" type="datetimeFigureOut">
               <a:rPr lang="en-US" smtClean="0"/>
-              <a:t>3/22/18</a:t>
+              <a:t>2/28/19</a:t>
             </a:fld>
             <a:endParaRPr lang="en-US"/>
           </a:p>
@@ -1344,10 +1768,9 @@
           <a:lstStyle/>
           <a:p>
             <a:r>
-              <a:rPr lang="en-US" smtClean="0"/>
+              <a:rPr lang="en-US"/>
               <a:t>Click to edit Master title style</a:t>
             </a:r>
-            <a:endParaRPr lang="en-US"/>
           </a:p>
         </p:txBody>
       </p:sp>
@@ -1410,7 +1833,7 @@
           <a:p>
             <a:pPr lvl="0"/>
             <a:r>
-              <a:rPr lang="en-US" smtClean="0"/>
+              <a:rPr lang="en-US"/>
               <a:t>Click to edit Master text styles</a:t>
             </a:r>
           </a:p>
@@ -1438,38 +1861,37 @@
           <a:p>
             <a:pPr lvl="0"/>
             <a:r>
-              <a:rPr lang="en-US" smtClean="0"/>
+              <a:rPr lang="en-US"/>
               <a:t>Click to edit Master text styles</a:t>
             </a:r>
           </a:p>
           <a:p>
             <a:pPr lvl="1"/>
             <a:r>
-              <a:rPr lang="en-US" smtClean="0"/>
+              <a:rPr lang="en-US"/>
               <a:t>Second level</a:t>
             </a:r>
           </a:p>
           <a:p>
             <a:pPr lvl="2"/>
             <a:r>
-              <a:rPr lang="en-US" smtClean="0"/>
+              <a:rPr lang="en-US"/>
               <a:t>Third level</a:t>
             </a:r>
           </a:p>
           <a:p>
             <a:pPr lvl="3"/>
             <a:r>
-              <a:rPr lang="en-US" smtClean="0"/>
+              <a:rPr lang="en-US"/>
               <a:t>Fourth level</a:t>
             </a:r>
           </a:p>
           <a:p>
             <a:pPr lvl="4"/>
             <a:r>
-              <a:rPr lang="en-US" smtClean="0"/>
+              <a:rPr lang="en-US"/>
               <a:t>Fifth level</a:t>
             </a:r>
-            <a:endParaRPr lang="en-US"/>
           </a:p>
         </p:txBody>
       </p:sp>
@@ -1532,7 +1954,7 @@
           <a:p>
             <a:pPr lvl="0"/>
             <a:r>
-              <a:rPr lang="en-US" smtClean="0"/>
+              <a:rPr lang="en-US"/>
               <a:t>Click to edit Master text styles</a:t>
             </a:r>
           </a:p>
@@ -1560,38 +1982,37 @@
           <a:p>
             <a:pPr lvl="0"/>
             <a:r>
-              <a:rPr lang="en-US" smtClean="0"/>
+              <a:rPr lang="en-US"/>
               <a:t>Click to edit Master text styles</a:t>
             </a:r>
           </a:p>
           <a:p>
             <a:pPr lvl="1"/>
             <a:r>
-              <a:rPr lang="en-US" smtClean="0"/>
+              <a:rPr lang="en-US"/>
               <a:t>Second level</a:t>
             </a:r>
           </a:p>
           <a:p>
             <a:pPr lvl="2"/>
             <a:r>
-              <a:rPr lang="en-US" smtClean="0"/>
+              <a:rPr lang="en-US"/>
               <a:t>Third level</a:t>
             </a:r>
           </a:p>
           <a:p>
             <a:pPr lvl="3"/>
             <a:r>
-              <a:rPr lang="en-US" smtClean="0"/>
+              <a:rPr lang="en-US"/>
               <a:t>Fourth level</a:t>
             </a:r>
           </a:p>
           <a:p>
             <a:pPr lvl="4"/>
             <a:r>
-              <a:rPr lang="en-US" smtClean="0"/>
+              <a:rPr lang="en-US"/>
               <a:t>Fifth level</a:t>
             </a:r>
-            <a:endParaRPr lang="en-US"/>
           </a:p>
         </p:txBody>
       </p:sp>
@@ -1612,7 +2033,7 @@
           <a:p>
             <a:fld id="{3DA3D352-7221-F147-996D-DAA8FC8F9D40}" type="datetimeFigureOut">
               <a:rPr lang="en-US" smtClean="0"/>
-              <a:t>3/22/18</a:t>
+              <a:t>2/28/19</a:t>
             </a:fld>
             <a:endParaRPr lang="en-US"/>
           </a:p>
@@ -1706,10 +2127,9 @@
           <a:lstStyle/>
           <a:p>
             <a:r>
-              <a:rPr lang="en-US" smtClean="0"/>
+              <a:rPr lang="en-US"/>
               <a:t>Click to edit Master title style</a:t>
             </a:r>
-            <a:endParaRPr lang="en-US"/>
           </a:p>
         </p:txBody>
       </p:sp>
@@ -1730,7 +2150,7 @@
           <a:p>
             <a:fld id="{3DA3D352-7221-F147-996D-DAA8FC8F9D40}" type="datetimeFigureOut">
               <a:rPr lang="en-US" smtClean="0"/>
-              <a:t>3/22/18</a:t>
+              <a:t>2/28/19</a:t>
             </a:fld>
             <a:endParaRPr lang="en-US"/>
           </a:p>
@@ -1825,7 +2245,7 @@
           <a:p>
             <a:fld id="{3DA3D352-7221-F147-996D-DAA8FC8F9D40}" type="datetimeFigureOut">
               <a:rPr lang="en-US" smtClean="0"/>
-              <a:t>3/22/18</a:t>
+              <a:t>2/28/19</a:t>
             </a:fld>
             <a:endParaRPr lang="en-US"/>
           </a:p>
@@ -1928,10 +2348,9 @@
           </a:lstStyle>
           <a:p>
             <a:r>
-              <a:rPr lang="en-US" smtClean="0"/>
+              <a:rPr lang="en-US"/>
               <a:t>Click to edit Master title style</a:t>
             </a:r>
-            <a:endParaRPr lang="en-US"/>
           </a:p>
         </p:txBody>
       </p:sp>
@@ -1985,38 +2404,37 @@
           <a:p>
             <a:pPr lvl="0"/>
             <a:r>
-              <a:rPr lang="en-US" smtClean="0"/>
+              <a:rPr lang="en-US"/>
               <a:t>Click to edit Master text styles</a:t>
             </a:r>
           </a:p>
           <a:p>
             <a:pPr lvl="1"/>
             <a:r>
-              <a:rPr lang="en-US" smtClean="0"/>
+              <a:rPr lang="en-US"/>
               <a:t>Second level</a:t>
             </a:r>
           </a:p>
           <a:p>
             <a:pPr lvl="2"/>
             <a:r>
-              <a:rPr lang="en-US" smtClean="0"/>
+              <a:rPr lang="en-US"/>
               <a:t>Third level</a:t>
             </a:r>
           </a:p>
           <a:p>
             <a:pPr lvl="3"/>
             <a:r>
-              <a:rPr lang="en-US" smtClean="0"/>
+              <a:rPr lang="en-US"/>
               <a:t>Fourth level</a:t>
             </a:r>
           </a:p>
           <a:p>
             <a:pPr lvl="4"/>
             <a:r>
-              <a:rPr lang="en-US" smtClean="0"/>
+              <a:rPr lang="en-US"/>
               <a:t>Fifth level</a:t>
             </a:r>
-            <a:endParaRPr lang="en-US"/>
           </a:p>
         </p:txBody>
       </p:sp>
@@ -2079,7 +2497,7 @@
           <a:p>
             <a:pPr lvl="0"/>
             <a:r>
-              <a:rPr lang="en-US" smtClean="0"/>
+              <a:rPr lang="en-US"/>
               <a:t>Click to edit Master text styles</a:t>
             </a:r>
           </a:p>
@@ -2102,7 +2520,7 @@
           <a:p>
             <a:fld id="{3DA3D352-7221-F147-996D-DAA8FC8F9D40}" type="datetimeFigureOut">
               <a:rPr lang="en-US" smtClean="0"/>
-              <a:t>3/22/18</a:t>
+              <a:t>2/28/19</a:t>
             </a:fld>
             <a:endParaRPr lang="en-US"/>
           </a:p>
@@ -2205,10 +2623,9 @@
           </a:lstStyle>
           <a:p>
             <a:r>
-              <a:rPr lang="en-US" smtClean="0"/>
+              <a:rPr lang="en-US"/>
               <a:t>Click to edit Master title style</a:t>
             </a:r>
-            <a:endParaRPr lang="en-US"/>
           </a:p>
         </p:txBody>
       </p:sp>
@@ -2332,7 +2749,7 @@
           <a:p>
             <a:pPr lvl="0"/>
             <a:r>
-              <a:rPr lang="en-US" smtClean="0"/>
+              <a:rPr lang="en-US"/>
               <a:t>Click to edit Master text styles</a:t>
             </a:r>
           </a:p>
@@ -2355,7 +2772,7 @@
           <a:p>
             <a:fld id="{3DA3D352-7221-F147-996D-DAA8FC8F9D40}" type="datetimeFigureOut">
               <a:rPr lang="en-US" smtClean="0"/>
-              <a:t>3/22/18</a:t>
+              <a:t>2/28/19</a:t>
             </a:fld>
             <a:endParaRPr lang="en-US"/>
           </a:p>
@@ -2464,10 +2881,9 @@
           <a:lstStyle/>
           <a:p>
             <a:r>
-              <a:rPr lang="en-US" smtClean="0"/>
+              <a:rPr lang="en-US"/>
               <a:t>Click to edit Master title style</a:t>
             </a:r>
-            <a:endParaRPr lang="en-US"/>
           </a:p>
         </p:txBody>
       </p:sp>
@@ -2498,38 +2914,37 @@
           <a:p>
             <a:pPr lvl="0"/>
             <a:r>
-              <a:rPr lang="en-US" smtClean="0"/>
+              <a:rPr lang="en-US"/>
               <a:t>Click to edit Master text styles</a:t>
             </a:r>
           </a:p>
           <a:p>
             <a:pPr lvl="1"/>
             <a:r>
-              <a:rPr lang="en-US" smtClean="0"/>
+              <a:rPr lang="en-US"/>
               <a:t>Second level</a:t>
             </a:r>
           </a:p>
           <a:p>
             <a:pPr lvl="2"/>
             <a:r>
-              <a:rPr lang="en-US" smtClean="0"/>
+              <a:rPr lang="en-US"/>
               <a:t>Third level</a:t>
             </a:r>
           </a:p>
           <a:p>
             <a:pPr lvl="3"/>
             <a:r>
-              <a:rPr lang="en-US" smtClean="0"/>
+              <a:rPr lang="en-US"/>
               <a:t>Fourth level</a:t>
             </a:r>
           </a:p>
           <a:p>
             <a:pPr lvl="4"/>
             <a:r>
-              <a:rPr lang="en-US" smtClean="0"/>
+              <a:rPr lang="en-US"/>
               <a:t>Fifth level</a:t>
             </a:r>
-            <a:endParaRPr lang="en-US"/>
           </a:p>
         </p:txBody>
       </p:sp>
@@ -2568,7 +2983,7 @@
           <a:p>
             <a:fld id="{3DA3D352-7221-F147-996D-DAA8FC8F9D40}" type="datetimeFigureOut">
               <a:rPr lang="en-US" smtClean="0"/>
-              <a:t>3/22/18</a:t>
+              <a:t>2/28/19</a:t>
             </a:fld>
             <a:endParaRPr lang="en-US"/>
           </a:p>
@@ -2989,18 +3404,17 @@
           <a:lstStyle/>
           <a:p>
             <a:r>
-              <a:rPr lang="en-US" dirty="0" smtClean="0"/>
-              <a:t>Assignment </a:t>
-            </a:r>
-            <a:r>
-              <a:rPr lang="mr-IN" dirty="0" smtClean="0"/>
+              <a:rPr lang="en-US" dirty="0"/>
+              <a:t>Thursday </a:t>
+            </a:r>
+            <a:r>
+              <a:rPr lang="mr-IN" dirty="0"/>
               <a:t>–</a:t>
             </a:r>
             <a:r>
-              <a:rPr lang="en-US" dirty="0" smtClean="0"/>
-              <a:t> Week 9</a:t>
-            </a:r>
-            <a:endParaRPr lang="en-US" dirty="0"/>
+              <a:rPr lang="en-US" dirty="0"/>
+              <a:t> Week 6</a:t>
+            </a:r>
           </a:p>
         </p:txBody>
       </p:sp>
@@ -3020,10 +3434,9 @@
           <a:lstStyle/>
           <a:p>
             <a:r>
-              <a:rPr lang="en-US" dirty="0" smtClean="0"/>
-              <a:t>Distribution</a:t>
-            </a:r>
-            <a:endParaRPr lang="en-US" dirty="0"/>
+              <a:rPr lang="en-US" dirty="0"/>
+              <a:t>Distributions</a:t>
+            </a:r>
           </a:p>
         </p:txBody>
       </p:sp>
@@ -3059,7 +3472,13 @@
       </p:grpSpPr>
       <p:sp>
         <p:nvSpPr>
-          <p:cNvPr id="2" name="Title 1"/>
+          <p:cNvPr id="2" name="Title 1">
+            <a:extLst>
+              <a:ext uri="{FF2B5EF4-FFF2-40B4-BE49-F238E27FC236}">
+                <a16:creationId xmlns:a16="http://schemas.microsoft.com/office/drawing/2014/main" id="{4F5D406E-281C-5C4A-8BA6-891C8EA636C9}"/>
+              </a:ext>
+            </a:extLst>
+          </p:cNvPr>
           <p:cNvSpPr>
             <a:spLocks noGrp="1"/>
           </p:cNvSpPr>
@@ -3073,63 +3492,122 @@
           <a:lstStyle/>
           <a:p>
             <a:r>
-              <a:rPr lang="en-US" dirty="0" smtClean="0"/>
-              <a:t>Cumulative distribution function (e.g. </a:t>
-            </a:r>
-            <a:r>
-              <a:rPr lang="en-US" dirty="0" err="1" smtClean="0"/>
-              <a:t>pnorm</a:t>
-            </a:r>
-            <a:r>
-              <a:rPr lang="en-US" dirty="0" smtClean="0"/>
-              <a:t>)</a:t>
-            </a:r>
+              <a:rPr lang="en-US" dirty="0"/>
+              <a:t>Announcement</a:t>
+            </a:r>
+          </a:p>
+        </p:txBody>
+      </p:sp>
+      <p:sp>
+        <p:nvSpPr>
+          <p:cNvPr id="3" name="Content Placeholder 2">
+            <a:extLst>
+              <a:ext uri="{FF2B5EF4-FFF2-40B4-BE49-F238E27FC236}">
+                <a16:creationId xmlns:a16="http://schemas.microsoft.com/office/drawing/2014/main" id="{5E2672F1-4933-1E40-B076-522CC527E0A1}"/>
+              </a:ext>
+            </a:extLst>
+          </p:cNvPr>
+          <p:cNvSpPr>
+            <a:spLocks noGrp="1"/>
+          </p:cNvSpPr>
+          <p:nvPr>
+            <p:ph idx="1"/>
+          </p:nvPr>
+        </p:nvSpPr>
+        <p:spPr/>
+        <p:txBody>
+          <a:bodyPr/>
+          <a:lstStyle/>
+          <a:p>
+            <a:r>
+              <a:rPr lang="en-US" dirty="0"/>
+              <a:t>Next week:</a:t>
+            </a:r>
+          </a:p>
+          <a:p>
+            <a:pPr lvl="1"/>
+            <a:r>
+              <a:rPr lang="en-US" dirty="0"/>
+              <a:t>Tuesday class </a:t>
+            </a:r>
+            <a:r>
+              <a:rPr lang="en-US" b="1" dirty="0"/>
+              <a:t>will not be held</a:t>
+            </a:r>
+            <a:br>
+              <a:rPr lang="en-US" b="1" dirty="0"/>
+            </a:br>
             <a:endParaRPr lang="en-US" dirty="0"/>
           </a:p>
-        </p:txBody>
-      </p:sp>
-      <p:sp>
-        <p:nvSpPr>
-          <p:cNvPr id="3" name="Content Placeholder 2"/>
-          <p:cNvSpPr>
-            <a:spLocks noGrp="1"/>
-          </p:cNvSpPr>
-          <p:nvPr>
-            <p:ph idx="1"/>
-          </p:nvPr>
-        </p:nvSpPr>
-        <p:spPr/>
-        <p:txBody>
-          <a:bodyPr/>
-          <a:lstStyle/>
-          <a:p>
-            <a:r>
-              <a:rPr lang="en-US" dirty="0"/>
-              <a:t>n</a:t>
-            </a:r>
-            <a:r>
-              <a:rPr lang="en-US" dirty="0" smtClean="0"/>
-              <a:t>ote: the value is less than or </a:t>
-            </a:r>
-            <a:r>
-              <a:rPr lang="en-US" b="1" dirty="0" smtClean="0"/>
-              <a:t>equal to</a:t>
-            </a:r>
-            <a:r>
-              <a:rPr lang="en-US" dirty="0" smtClean="0"/>
-              <a:t> x</a:t>
-            </a:r>
-          </a:p>
-          <a:p>
+          <a:p>
+            <a:pPr lvl="1"/>
+            <a:r>
+              <a:rPr lang="en-US" dirty="0"/>
+              <a:t>Use this time to read:</a:t>
+            </a:r>
+          </a:p>
+          <a:p>
+            <a:pPr lvl="2"/>
+            <a:r>
+              <a:rPr lang="en-US" dirty="0"/>
+              <a:t>1) Chapter on Distributions from Ben </a:t>
+            </a:r>
+            <a:r>
+              <a:rPr lang="en-US" dirty="0" err="1"/>
+              <a:t>Bolkers</a:t>
+            </a:r>
+            <a:r>
+              <a:rPr lang="en-US" dirty="0"/>
+              <a:t> book (posted)</a:t>
+            </a:r>
+          </a:p>
+          <a:p>
+            <a:pPr lvl="3"/>
+            <a:r>
+              <a:rPr lang="en-US" dirty="0"/>
+              <a:t>There is a short quiz activity on canvas</a:t>
+            </a:r>
+          </a:p>
+          <a:p>
+            <a:pPr lvl="3"/>
+            <a:r>
+              <a:rPr lang="en-US" b="1" dirty="0"/>
+              <a:t>Complete the quiz by Wednesday evening at 11:59 PM</a:t>
+            </a:r>
+          </a:p>
+          <a:p>
+            <a:pPr lvl="2"/>
+            <a:r>
+              <a:rPr lang="en-US" dirty="0"/>
+              <a:t>2) </a:t>
+            </a:r>
+            <a:r>
+              <a:rPr lang="en-US" dirty="0" err="1"/>
+              <a:t>Felsenstein</a:t>
+            </a:r>
+            <a:r>
+              <a:rPr lang="en-US" dirty="0"/>
+              <a:t> 1985 Am Nat (posted)</a:t>
+            </a:r>
+          </a:p>
+          <a:p>
+            <a:pPr marL="914400" lvl="2" indent="0">
+              <a:buNone/>
+            </a:pPr>
+            <a:br>
+              <a:rPr lang="en-US" dirty="0"/>
+            </a:br>
             <a:endParaRPr lang="en-US" dirty="0"/>
           </a:p>
           <a:p>
-            <a:endParaRPr lang="en-US" dirty="0" smtClean="0"/>
-          </a:p>
-          <a:p>
-            <a:endParaRPr lang="en-US" dirty="0"/>
-          </a:p>
-          <a:p>
+            <a:pPr lvl="1"/>
+            <a:r>
+              <a:rPr lang="en-US" dirty="0"/>
+              <a:t>Thursday class: Dr. Josef Uyeda discussing working with phylogenies in R</a:t>
+            </a:r>
+            <a:br>
+              <a:rPr lang="en-US" dirty="0"/>
+            </a:br>
             <a:endParaRPr lang="en-US" dirty="0"/>
           </a:p>
         </p:txBody>
@@ -3137,7 +3615,7 @@
     </p:spTree>
     <p:extLst>
       <p:ext uri="{BB962C8B-B14F-4D97-AF65-F5344CB8AC3E}">
-        <p14:creationId xmlns:p14="http://schemas.microsoft.com/office/powerpoint/2010/main" val="1922376127"/>
+        <p14:creationId xmlns:p14="http://schemas.microsoft.com/office/powerpoint/2010/main" val="744812779"/>
       </p:ext>
     </p:extLst>
   </p:cSld>
@@ -3180,10 +3658,9 @@
           <a:lstStyle/>
           <a:p>
             <a:r>
-              <a:rPr lang="en-US" smtClean="0"/>
+              <a:rPr lang="en-US"/>
               <a:t>Exercises</a:t>
             </a:r>
-            <a:endParaRPr lang="en-US"/>
           </a:p>
         </p:txBody>
       </p:sp>
@@ -3210,87 +3687,83 @@
           <a:lstStyle/>
           <a:p>
             <a:r>
-              <a:rPr lang="en-US" dirty="0" smtClean="0"/>
+              <a:rPr lang="en-US" dirty="0"/>
               <a:t>A wolf population has 500 pairs remaining.  If each wolf pair normally has around a 4 pups, but the fraction of wolves born with a lethal recessive allele is 0.2, how many live offspring are likely to be born alive?</a:t>
             </a:r>
             <a:br>
-              <a:rPr lang="en-US" dirty="0" smtClean="0"/>
+              <a:rPr lang="en-US" dirty="0"/>
             </a:br>
             <a:r>
-              <a:rPr lang="en-US" dirty="0" smtClean="0"/>
+              <a:rPr lang="en-US" dirty="0"/>
               <a:t>(Hint </a:t>
             </a:r>
             <a:r>
-              <a:rPr lang="mr-IN" dirty="0" smtClean="0"/>
+              <a:rPr lang="mr-IN" dirty="0"/>
               <a:t>–</a:t>
             </a:r>
             <a:r>
-              <a:rPr lang="en-US" dirty="0" smtClean="0"/>
+              <a:rPr lang="en-US" dirty="0"/>
               <a:t> you need to draw randomly from 2 different distributions!)</a:t>
             </a:r>
             <a:br>
-              <a:rPr lang="en-US" dirty="0" smtClean="0"/>
+              <a:rPr lang="en-US" dirty="0"/>
             </a:br>
-            <a:endParaRPr lang="en-US" dirty="0" smtClean="0"/>
-          </a:p>
-          <a:p>
-            <a:r>
-              <a:rPr lang="en-US" dirty="0" smtClean="0"/>
+            <a:endParaRPr lang="en-US" dirty="0"/>
+          </a:p>
+          <a:p>
+            <a:r>
+              <a:rPr lang="en-US" dirty="0"/>
               <a:t>If there are 1000 seeds in a seedbank and each seed has a 2% chance of being eaten and a 1% probability of sprouting each day, how many seedlings would we expect to see sprouting each day? Over 100 days?</a:t>
             </a:r>
           </a:p>
           <a:p>
             <a:r>
-              <a:rPr lang="en-US" dirty="0" smtClean="0"/>
+              <a:rPr lang="en-US" dirty="0"/>
               <a:t>The number of eggs laid by squid varies dramatically among individuals. The mean number of eggs is 300, but the dispersion is 1. What is the 85</a:t>
             </a:r>
             <a:r>
-              <a:rPr lang="en-US" baseline="30000" dirty="0" smtClean="0"/>
+              <a:rPr lang="en-US" baseline="30000" dirty="0"/>
               <a:t>th</a:t>
             </a:r>
             <a:r>
-              <a:rPr lang="en-US" dirty="0" smtClean="0"/>
+              <a:rPr lang="en-US" dirty="0"/>
               <a:t> percentile of the number of eggs laid?</a:t>
             </a:r>
           </a:p>
           <a:p>
             <a:r>
-              <a:rPr lang="en-US" dirty="0" smtClean="0"/>
+              <a:rPr lang="en-US" dirty="0"/>
               <a:t>I census 15 populations of </a:t>
             </a:r>
             <a:r>
-              <a:rPr lang="en-US" dirty="0" err="1" smtClean="0"/>
+              <a:rPr lang="en-US" dirty="0" err="1"/>
               <a:t>pikas</a:t>
             </a:r>
             <a:r>
-              <a:rPr lang="en-US" dirty="0" smtClean="0"/>
+              <a:rPr lang="en-US" dirty="0"/>
               <a:t> on 15 mountains. I find that the average population size is 10. What is the probability of  a population of more than 12 individuals?</a:t>
             </a:r>
-            <a:r>
-              <a:rPr lang="en-US" dirty="0"/>
-              <a:t/>
-            </a:r>
             <a:br>
               <a:rPr lang="en-US" dirty="0"/>
             </a:br>
             <a:r>
-              <a:rPr lang="en-US" dirty="0" smtClean="0"/>
+              <a:rPr lang="en-US" dirty="0"/>
               <a:t>(Hint </a:t>
             </a:r>
             <a:r>
-              <a:rPr lang="mr-IN" dirty="0" smtClean="0"/>
+              <a:rPr lang="mr-IN" dirty="0"/>
               <a:t>–</a:t>
             </a:r>
             <a:r>
-              <a:rPr lang="en-US" dirty="0" smtClean="0"/>
+              <a:rPr lang="en-US" dirty="0"/>
               <a:t> there is information here that you don’t need</a:t>
             </a:r>
             <a:r>
-              <a:rPr lang="mr-IN" dirty="0" smtClean="0"/>
+              <a:rPr lang="mr-IN" dirty="0"/>
               <a:t>…</a:t>
             </a:r>
             <a:r>
-              <a:rPr lang="en-US" dirty="0" smtClean="0"/>
+              <a:rPr lang="en-US" dirty="0"/>
               <a:t>)</a:t>
             </a:r>
           </a:p>
@@ -3329,13 +3802,6 @@
   <p:clrMapOvr>
     <a:masterClrMapping/>
   </p:clrMapOvr>
-  <p:timing>
-    <p:tnLst>
-      <p:par>
-        <p:cTn id="1" dur="indefinite" restart="never" nodeType="tmRoot"/>
-      </p:par>
-    </p:tnLst>
-  </p:timing>
 </p:sld>
 </file>
 
@@ -3372,10 +3838,9 @@
           <a:lstStyle/>
           <a:p>
             <a:r>
-              <a:rPr lang="en-US" smtClean="0"/>
+              <a:rPr lang="en-US"/>
               <a:t>Exercises</a:t>
             </a:r>
-            <a:endParaRPr lang="en-US"/>
           </a:p>
         </p:txBody>
       </p:sp>
@@ -3403,328 +3868,269 @@
           <a:p>
             <a:r>
               <a:rPr lang="en-US" dirty="0"/>
-              <a:t>A wolf population has 500 </a:t>
-            </a:r>
-            <a:r>
-              <a:rPr lang="en-US" dirty="0" smtClean="0"/>
-              <a:t>pairs remaining</a:t>
-            </a:r>
-            <a:r>
-              <a:rPr lang="en-US" dirty="0"/>
-              <a:t>.  If </a:t>
-            </a:r>
-            <a:r>
-              <a:rPr lang="en-US" dirty="0" smtClean="0"/>
-              <a:t>each wolf pair normally has around a 4 pups, but the fraction of </a:t>
-            </a:r>
-            <a:r>
-              <a:rPr lang="en-US" dirty="0"/>
-              <a:t>wolves </a:t>
-            </a:r>
-            <a:r>
-              <a:rPr lang="en-US" dirty="0" smtClean="0"/>
-              <a:t>born with a </a:t>
-            </a:r>
-            <a:r>
-              <a:rPr lang="en-US" dirty="0"/>
-              <a:t>lethal recessive </a:t>
-            </a:r>
-            <a:r>
-              <a:rPr lang="en-US" dirty="0" smtClean="0"/>
-              <a:t>allele is 0.2, how </a:t>
-            </a:r>
-            <a:r>
-              <a:rPr lang="en-US" dirty="0"/>
-              <a:t>many live offspring are likely to be </a:t>
-            </a:r>
-            <a:r>
-              <a:rPr lang="en-US" dirty="0" smtClean="0"/>
-              <a:t>born alive?</a:t>
+              <a:t>A wolf population has 500 pairs remaining.  If each wolf pair normally has around a 4 pups, but the fraction of wolves born with a lethal recessive allele is 0.2, how many live offspring are likely to be born alive?</a:t>
+            </a:r>
+          </a:p>
+          <a:p>
+            <a:pPr lvl="1"/>
+            <a:r>
+              <a:rPr lang="en-US" dirty="0" err="1"/>
+              <a:t>pupstot</a:t>
+            </a:r>
+            <a:r>
+              <a:rPr lang="en-US" dirty="0"/>
+              <a:t> =</a:t>
+            </a:r>
+            <a:r>
+              <a:rPr lang="en-US" dirty="0" err="1"/>
+              <a:t>rpois</a:t>
+            </a:r>
+            <a:r>
+              <a:rPr lang="en-US" dirty="0"/>
+              <a:t>(500,lambda =4)</a:t>
+            </a:r>
+            <a:br>
+              <a:rPr lang="en-US" dirty="0"/>
+            </a:br>
+            <a:r>
+              <a:rPr lang="en-US" dirty="0"/>
+              <a:t>livebirths = </a:t>
+            </a:r>
+            <a:r>
+              <a:rPr lang="en-US" dirty="0" err="1"/>
+              <a:t>rbinom</a:t>
+            </a:r>
+            <a:r>
+              <a:rPr lang="en-US" dirty="0"/>
+              <a:t>(500,size =</a:t>
+            </a:r>
+            <a:r>
+              <a:rPr lang="en-US" dirty="0" err="1"/>
+              <a:t>pupstot,p</a:t>
+            </a:r>
+            <a:r>
+              <a:rPr lang="en-US" dirty="0"/>
+              <a:t>=.8) </a:t>
+            </a:r>
+          </a:p>
+          <a:p>
+            <a:r>
+              <a:rPr lang="en-US" dirty="0"/>
+              <a:t>If there are 1000 seeds in a seedbank and each seed has a 2% chance of being eaten and a 1% probability of sprouting each day, how many seedlings would we expect to see sprouting each day? Over 100 days?</a:t>
+            </a:r>
+          </a:p>
+          <a:p>
+            <a:pPr lvl="1"/>
+            <a:r>
+              <a:rPr lang="mr-IN" dirty="0"/>
+              <a:t>#</a:t>
+            </a:r>
+            <a:r>
+              <a:rPr lang="mr-IN" dirty="0" err="1"/>
+              <a:t>one</a:t>
+            </a:r>
+            <a:r>
+              <a:rPr lang="mr-IN" dirty="0"/>
+              <a:t> </a:t>
+            </a:r>
+            <a:r>
+              <a:rPr lang="mr-IN" dirty="0" err="1"/>
+              <a:t>day</a:t>
             </a:r>
             <a:endParaRPr lang="en-US" dirty="0"/>
           </a:p>
           <a:p>
+            <a:pPr lvl="2"/>
+            <a:r>
+              <a:rPr lang="en-US" dirty="0" err="1"/>
+              <a:t>seeds.not.eaten</a:t>
+            </a:r>
+            <a:r>
+              <a:rPr lang="en-US" dirty="0"/>
+              <a:t> = </a:t>
+            </a:r>
+            <a:r>
+              <a:rPr lang="en-US" dirty="0" err="1"/>
+              <a:t>rbinom</a:t>
+            </a:r>
+            <a:r>
+              <a:rPr lang="en-US" dirty="0"/>
+              <a:t>(1000,size=1,p = .98)</a:t>
+            </a:r>
+          </a:p>
+          <a:p>
+            <a:pPr lvl="2"/>
+            <a:r>
+              <a:rPr lang="en-US" dirty="0" err="1"/>
+              <a:t>seeds.sprouted</a:t>
+            </a:r>
+            <a:r>
+              <a:rPr lang="en-US" dirty="0"/>
+              <a:t> = </a:t>
+            </a:r>
+            <a:r>
+              <a:rPr lang="en-US" dirty="0" err="1"/>
+              <a:t>rbinom</a:t>
+            </a:r>
+            <a:r>
+              <a:rPr lang="en-US" dirty="0"/>
+              <a:t>(n = </a:t>
+            </a:r>
+            <a:r>
+              <a:rPr lang="en-US" dirty="0" err="1"/>
+              <a:t>seeds.not.eaten,size</a:t>
+            </a:r>
+            <a:r>
+              <a:rPr lang="en-US" dirty="0"/>
+              <a:t>=1, p=.01 )</a:t>
+            </a:r>
+          </a:p>
+          <a:p>
+            <a:pPr lvl="2"/>
+            <a:r>
+              <a:rPr lang="en-US" dirty="0"/>
+              <a:t>Sum(</a:t>
+            </a:r>
+            <a:r>
+              <a:rPr lang="en-US" dirty="0" err="1"/>
+              <a:t>seeds.sprouted</a:t>
+            </a:r>
+            <a:r>
+              <a:rPr lang="en-US" dirty="0"/>
+              <a:t>)</a:t>
+            </a:r>
+            <a:br>
+              <a:rPr lang="en-US" dirty="0"/>
+            </a:br>
+            <a:endParaRPr lang="en-US" dirty="0"/>
+          </a:p>
+          <a:p>
             <a:pPr lvl="1"/>
             <a:r>
-              <a:rPr lang="en-US" dirty="0" err="1" smtClean="0"/>
-              <a:t>pupstot</a:t>
-            </a:r>
-            <a:r>
-              <a:rPr lang="en-US" dirty="0" smtClean="0"/>
-              <a:t> =</a:t>
-            </a:r>
-            <a:r>
-              <a:rPr lang="en-US" dirty="0" err="1" smtClean="0"/>
-              <a:t>rpois</a:t>
-            </a:r>
-            <a:r>
-              <a:rPr lang="en-US" dirty="0" smtClean="0"/>
-              <a:t>(500,lambda =4)</a:t>
+              <a:rPr lang="mr-IN" dirty="0"/>
+              <a:t>#100 </a:t>
+            </a:r>
+            <a:r>
+              <a:rPr lang="mr-IN" dirty="0" err="1"/>
+              <a:t>day</a:t>
+            </a:r>
+            <a:r>
+              <a:rPr lang="en-US" dirty="0"/>
+              <a:t>s</a:t>
+            </a:r>
+          </a:p>
+          <a:p>
+            <a:pPr lvl="2"/>
+            <a:r>
+              <a:rPr lang="mr-IN" dirty="0" err="1"/>
+              <a:t>sum</a:t>
+            </a:r>
+            <a:r>
+              <a:rPr lang="mr-IN" dirty="0"/>
+              <a:t>(</a:t>
+            </a:r>
+            <a:r>
+              <a:rPr lang="mr-IN" dirty="0" err="1"/>
+              <a:t>rbinom</a:t>
+            </a:r>
+            <a:r>
+              <a:rPr lang="mr-IN" dirty="0"/>
+              <a:t>(</a:t>
+            </a:r>
+            <a:r>
+              <a:rPr lang="mr-IN" dirty="0" err="1"/>
+              <a:t>n</a:t>
+            </a:r>
+            <a:r>
+              <a:rPr lang="mr-IN" dirty="0"/>
+              <a:t> = </a:t>
+            </a:r>
+            <a:r>
+              <a:rPr lang="mr-IN" dirty="0" err="1"/>
+              <a:t>sum</a:t>
+            </a:r>
+            <a:r>
+              <a:rPr lang="mr-IN" dirty="0"/>
+              <a:t>(</a:t>
+            </a:r>
+            <a:r>
+              <a:rPr lang="mr-IN" dirty="0" err="1"/>
+              <a:t>rbinom</a:t>
+            </a:r>
+            <a:r>
+              <a:rPr lang="mr-IN" dirty="0"/>
+              <a:t>(1000,size=1,p = .98)),</a:t>
+            </a:r>
+            <a:r>
+              <a:rPr lang="mr-IN" dirty="0" err="1"/>
+              <a:t>size</a:t>
+            </a:r>
+            <a:r>
+              <a:rPr lang="mr-IN" dirty="0"/>
+              <a:t>=100, </a:t>
+            </a:r>
+            <a:r>
+              <a:rPr lang="mr-IN" dirty="0" err="1"/>
+              <a:t>p</a:t>
+            </a:r>
+            <a:r>
+              <a:rPr lang="mr-IN" dirty="0"/>
+              <a:t>=.01 ))</a:t>
             </a:r>
             <a:br>
-              <a:rPr lang="en-US" dirty="0" smtClean="0"/>
+              <a:rPr lang="en-US" dirty="0"/>
             </a:br>
-            <a:r>
-              <a:rPr lang="en-US" dirty="0" smtClean="0"/>
-              <a:t>livebirths = </a:t>
-            </a:r>
-            <a:r>
-              <a:rPr lang="en-US" dirty="0" err="1" smtClean="0"/>
-              <a:t>rbinom</a:t>
-            </a:r>
-            <a:r>
-              <a:rPr lang="en-US" dirty="0" smtClean="0"/>
-              <a:t>(500,size =</a:t>
-            </a:r>
-            <a:r>
-              <a:rPr lang="en-US" dirty="0" err="1" smtClean="0"/>
-              <a:t>pupstot,p</a:t>
-            </a:r>
-            <a:r>
-              <a:rPr lang="en-US" dirty="0" smtClean="0"/>
-              <a:t>=.8) </a:t>
-            </a:r>
-          </a:p>
-          <a:p>
-            <a:r>
-              <a:rPr lang="en-US" dirty="0" smtClean="0"/>
-              <a:t>If </a:t>
-            </a:r>
-            <a:r>
-              <a:rPr lang="en-US" dirty="0"/>
-              <a:t>there are 1000 seeds in a seedbank and each seed has a 2% chance of being eaten and a 1% probability of sprouting each day, how many seedlings would we expect to see sprouting each </a:t>
-            </a:r>
-            <a:r>
-              <a:rPr lang="en-US" dirty="0" smtClean="0"/>
-              <a:t>day? Over 100 days?</a:t>
-            </a:r>
             <a:endParaRPr lang="en-US" dirty="0"/>
           </a:p>
           <a:p>
+            <a:r>
+              <a:rPr lang="en-US" dirty="0"/>
+              <a:t>The number of eggs laid by squid varies dramatically among individuals. The mean number of eggs is 300, but the dispersion is 1. What is the 85</a:t>
+            </a:r>
+            <a:r>
+              <a:rPr lang="en-US" baseline="30000" dirty="0"/>
+              <a:t>th</a:t>
+            </a:r>
+            <a:r>
+              <a:rPr lang="en-US" dirty="0"/>
+              <a:t> percentile of the number of eggs laid?</a:t>
+            </a:r>
+          </a:p>
+          <a:p>
             <a:pPr lvl="1"/>
             <a:r>
-              <a:rPr lang="mr-IN" dirty="0" smtClean="0"/>
-              <a:t>#</a:t>
-            </a:r>
-            <a:r>
-              <a:rPr lang="mr-IN" dirty="0" err="1" smtClean="0"/>
-              <a:t>one</a:t>
-            </a:r>
-            <a:r>
-              <a:rPr lang="mr-IN" dirty="0" smtClean="0"/>
-              <a:t> </a:t>
-            </a:r>
-            <a:r>
-              <a:rPr lang="mr-IN" dirty="0" err="1" smtClean="0"/>
-              <a:t>day</a:t>
-            </a:r>
-            <a:endParaRPr lang="en-US" dirty="0" smtClean="0"/>
-          </a:p>
-          <a:p>
-            <a:pPr lvl="2"/>
-            <a:r>
-              <a:rPr lang="en-US" dirty="0" err="1" smtClean="0"/>
-              <a:t>seeds.not.eaten</a:t>
-            </a:r>
-            <a:r>
-              <a:rPr lang="en-US" dirty="0" smtClean="0"/>
-              <a:t> = </a:t>
-            </a:r>
-            <a:r>
-              <a:rPr lang="en-US" dirty="0" err="1" smtClean="0"/>
-              <a:t>rbinom</a:t>
-            </a:r>
-            <a:r>
-              <a:rPr lang="en-US" dirty="0" smtClean="0"/>
-              <a:t>(1000,size=1,p = .98)</a:t>
-            </a:r>
-          </a:p>
-          <a:p>
-            <a:pPr lvl="2"/>
-            <a:r>
-              <a:rPr lang="en-US" dirty="0" err="1" smtClean="0"/>
-              <a:t>seeds.sprouted</a:t>
-            </a:r>
-            <a:r>
-              <a:rPr lang="en-US" dirty="0" smtClean="0"/>
-              <a:t> = </a:t>
-            </a:r>
-            <a:r>
-              <a:rPr lang="en-US" dirty="0" err="1" smtClean="0"/>
-              <a:t>rbinom</a:t>
-            </a:r>
-            <a:r>
-              <a:rPr lang="en-US" dirty="0" smtClean="0"/>
-              <a:t>(n = </a:t>
-            </a:r>
-            <a:r>
-              <a:rPr lang="en-US" dirty="0" err="1" smtClean="0"/>
-              <a:t>seeds.not.eaten,size</a:t>
-            </a:r>
-            <a:r>
-              <a:rPr lang="en-US" dirty="0" smtClean="0"/>
-              <a:t>=1, p=.01 )</a:t>
-            </a:r>
-          </a:p>
-          <a:p>
-            <a:pPr lvl="2"/>
-            <a:r>
-              <a:rPr lang="en-US" dirty="0" smtClean="0"/>
-              <a:t>Sum(</a:t>
-            </a:r>
-            <a:r>
-              <a:rPr lang="en-US" dirty="0" err="1" smtClean="0"/>
-              <a:t>seeds.sprouted</a:t>
-            </a:r>
-            <a:r>
-              <a:rPr lang="en-US" dirty="0" smtClean="0"/>
-              <a:t>)</a:t>
+              <a:rPr lang="mr-IN" dirty="0" err="1"/>
+              <a:t>qnbinom</a:t>
+            </a:r>
+            <a:r>
+              <a:rPr lang="mr-IN" dirty="0"/>
+              <a:t>(</a:t>
+            </a:r>
+            <a:r>
+              <a:rPr lang="mr-IN" dirty="0" err="1"/>
+              <a:t>p</a:t>
+            </a:r>
+            <a:r>
+              <a:rPr lang="mr-IN" dirty="0"/>
+              <a:t>=.85,mu = 300, </a:t>
+            </a:r>
+            <a:r>
+              <a:rPr lang="mr-IN" dirty="0" err="1"/>
+              <a:t>size</a:t>
+            </a:r>
+            <a:r>
+              <a:rPr lang="mr-IN" dirty="0"/>
+              <a:t>=1)</a:t>
             </a:r>
             <a:br>
-              <a:rPr lang="en-US" dirty="0" smtClean="0"/>
+              <a:rPr lang="en-US" dirty="0"/>
             </a:br>
-            <a:endParaRPr lang="en-US" dirty="0" smtClean="0"/>
-          </a:p>
-          <a:p>
-            <a:pPr lvl="1"/>
-            <a:r>
-              <a:rPr lang="mr-IN" dirty="0" smtClean="0"/>
-              <a:t>#100 </a:t>
-            </a:r>
-            <a:r>
-              <a:rPr lang="mr-IN" dirty="0" err="1" smtClean="0"/>
-              <a:t>day</a:t>
-            </a:r>
-            <a:r>
-              <a:rPr lang="en-US" dirty="0" smtClean="0"/>
-              <a:t>s</a:t>
-            </a:r>
-          </a:p>
-          <a:p>
-            <a:pPr lvl="2"/>
-            <a:r>
-              <a:rPr lang="mr-IN" dirty="0" err="1" smtClean="0"/>
-              <a:t>sum</a:t>
-            </a:r>
-            <a:r>
-              <a:rPr lang="mr-IN" dirty="0" smtClean="0"/>
-              <a:t>(</a:t>
-            </a:r>
-            <a:r>
-              <a:rPr lang="mr-IN" dirty="0" err="1" smtClean="0"/>
-              <a:t>rbinom</a:t>
-            </a:r>
-            <a:r>
-              <a:rPr lang="mr-IN" dirty="0" smtClean="0"/>
-              <a:t>(</a:t>
-            </a:r>
-            <a:r>
-              <a:rPr lang="mr-IN" dirty="0" err="1" smtClean="0"/>
-              <a:t>n</a:t>
-            </a:r>
-            <a:r>
-              <a:rPr lang="mr-IN" dirty="0" smtClean="0"/>
-              <a:t> = </a:t>
-            </a:r>
-            <a:r>
-              <a:rPr lang="mr-IN" dirty="0" err="1" smtClean="0"/>
-              <a:t>sum</a:t>
-            </a:r>
-            <a:r>
-              <a:rPr lang="mr-IN" dirty="0" smtClean="0"/>
-              <a:t>(</a:t>
-            </a:r>
-            <a:r>
-              <a:rPr lang="mr-IN" dirty="0" err="1" smtClean="0"/>
-              <a:t>rbinom</a:t>
-            </a:r>
-            <a:r>
-              <a:rPr lang="mr-IN" dirty="0" smtClean="0"/>
-              <a:t>(1000,size=1,p = .98)),</a:t>
-            </a:r>
-            <a:r>
-              <a:rPr lang="mr-IN" dirty="0" err="1" smtClean="0"/>
-              <a:t>size</a:t>
-            </a:r>
-            <a:r>
-              <a:rPr lang="mr-IN" dirty="0" smtClean="0"/>
-              <a:t>=100, </a:t>
-            </a:r>
-            <a:r>
-              <a:rPr lang="mr-IN" dirty="0" err="1" smtClean="0"/>
-              <a:t>p</a:t>
-            </a:r>
-            <a:r>
-              <a:rPr lang="mr-IN" dirty="0" smtClean="0"/>
-              <a:t>=.01 ))</a:t>
-            </a:r>
-            <a:r>
-              <a:rPr lang="en-US" dirty="0" smtClean="0"/>
-              <a:t/>
-            </a:r>
-            <a:br>
-              <a:rPr lang="en-US" dirty="0" smtClean="0"/>
-            </a:br>
-            <a:endParaRPr lang="en-US" dirty="0" smtClean="0"/>
-          </a:p>
-          <a:p>
-            <a:r>
-              <a:rPr lang="en-US" dirty="0" smtClean="0"/>
-              <a:t>The number of eggs laid by squid varies dramatically among individuals. The mean number of eggs is 300, but the dispersion is 1. What is the 85</a:t>
-            </a:r>
-            <a:r>
-              <a:rPr lang="en-US" baseline="30000" dirty="0" smtClean="0"/>
-              <a:t>th</a:t>
-            </a:r>
-            <a:r>
-              <a:rPr lang="en-US" dirty="0" smtClean="0"/>
-              <a:t> percentile of the number of eggs laid?</a:t>
-            </a:r>
             <a:endParaRPr lang="en-US" dirty="0"/>
           </a:p>
           <a:p>
-            <a:pPr lvl="1"/>
-            <a:r>
-              <a:rPr lang="mr-IN" dirty="0" err="1" smtClean="0"/>
-              <a:t>qnbinom</a:t>
-            </a:r>
-            <a:r>
-              <a:rPr lang="mr-IN" dirty="0" smtClean="0"/>
-              <a:t>(</a:t>
-            </a:r>
-            <a:r>
-              <a:rPr lang="mr-IN" dirty="0" err="1" smtClean="0"/>
-              <a:t>p</a:t>
-            </a:r>
-            <a:r>
-              <a:rPr lang="mr-IN" dirty="0" smtClean="0"/>
-              <a:t>=.85,mu = 300, </a:t>
-            </a:r>
-            <a:r>
-              <a:rPr lang="mr-IN" dirty="0" err="1" smtClean="0"/>
-              <a:t>size</a:t>
-            </a:r>
-            <a:r>
-              <a:rPr lang="mr-IN" dirty="0" smtClean="0"/>
-              <a:t>=1)</a:t>
-            </a:r>
-            <a:r>
-              <a:rPr lang="en-US" dirty="0" smtClean="0"/>
-              <a:t/>
-            </a:r>
-            <a:br>
-              <a:rPr lang="en-US" dirty="0" smtClean="0"/>
-            </a:br>
-            <a:endParaRPr lang="en-US" dirty="0" smtClean="0"/>
-          </a:p>
-          <a:p>
-            <a:r>
-              <a:rPr lang="en-US" dirty="0" smtClean="0"/>
-              <a:t>I </a:t>
-            </a:r>
-            <a:r>
-              <a:rPr lang="en-US" dirty="0"/>
-              <a:t>census 15 populations of </a:t>
+            <a:r>
+              <a:rPr lang="en-US" dirty="0"/>
+              <a:t>I census 15 populations of </a:t>
             </a:r>
             <a:r>
               <a:rPr lang="en-US" dirty="0" err="1"/>
@@ -3732,32 +4138,27 @@
             </a:r>
             <a:r>
               <a:rPr lang="en-US" dirty="0"/>
-              <a:t> on 15 </a:t>
-            </a:r>
-            <a:r>
-              <a:rPr lang="en-US" dirty="0" smtClean="0"/>
-              <a:t>mountains. I find that the average population size is 10. What is the probability of  a population of more than 12 individuals?</a:t>
+              <a:t> on 15 mountains. I find that the average population size is 10. What is the probability of  a population of more than 12 individuals?</a:t>
             </a:r>
           </a:p>
           <a:p>
             <a:pPr lvl="1"/>
             <a:r>
-              <a:rPr lang="en-US" dirty="0" err="1" smtClean="0"/>
+              <a:rPr lang="en-US" dirty="0" err="1"/>
               <a:t>ppois</a:t>
             </a:r>
             <a:r>
-              <a:rPr lang="en-US" dirty="0" smtClean="0"/>
+              <a:rPr lang="en-US" dirty="0"/>
               <a:t>(q = 12, lambda = 10, </a:t>
             </a:r>
             <a:r>
-              <a:rPr lang="en-US" dirty="0" err="1" smtClean="0"/>
+              <a:rPr lang="en-US" dirty="0" err="1"/>
               <a:t>lower.tail</a:t>
             </a:r>
             <a:r>
-              <a:rPr lang="en-US" dirty="0" smtClean="0"/>
+              <a:rPr lang="en-US" dirty="0"/>
               <a:t> = F)</a:t>
             </a:r>
-            <a:endParaRPr lang="en-US" dirty="0"/>
           </a:p>
         </p:txBody>
       </p:sp>
@@ -3830,18 +4231,24 @@
           <a:lstStyle/>
           <a:p>
             <a:r>
-              <a:rPr lang="en-US" dirty="0" smtClean="0"/>
+              <a:rPr lang="en-US" dirty="0"/>
               <a:t>Distributions </a:t>
             </a:r>
             <a:r>
-              <a:rPr lang="mr-IN" dirty="0" smtClean="0"/>
+              <a:rPr lang="mr-IN" dirty="0"/>
               <a:t>–</a:t>
             </a:r>
             <a:r>
-              <a:rPr lang="en-US" dirty="0" smtClean="0"/>
-              <a:t> Part 1. Assignment</a:t>
-            </a:r>
-            <a:endParaRPr lang="en-US" dirty="0"/>
+              <a:rPr lang="en-US" dirty="0"/>
+              <a:t>Assignment</a:t>
+            </a:r>
+            <a:br>
+              <a:rPr lang="en-US" dirty="0"/>
+            </a:br>
+            <a:r>
+              <a:rPr lang="en-US" dirty="0"/>
+              <a:t>Due Wed March 13</a:t>
+            </a:r>
           </a:p>
         </p:txBody>
       </p:sp>
@@ -3866,7 +4273,7 @@
               <a:buNone/>
             </a:pPr>
             <a:r>
-              <a:rPr lang="en-US" dirty="0" smtClean="0"/>
+              <a:rPr lang="en-US" dirty="0"/>
               <a:t>1. Describe a response variable in your dataset. Make a histogram of this variable. What distribution might you use to model your data? </a:t>
             </a:r>
           </a:p>
@@ -3881,27 +4288,23 @@
               <a:buNone/>
             </a:pPr>
             <a:r>
-              <a:rPr lang="en-US" dirty="0" smtClean="0"/>
-              <a:t>2. Draw from a random distribution of this type to create a pseudo-dataset. (How many times should you draw</a:t>
-            </a:r>
-            <a:r>
-              <a:rPr lang="en-US" dirty="0" smtClean="0"/>
-              <a:t>?) You can get an estimate of parameters using the “</a:t>
-            </a:r>
-            <a:r>
-              <a:rPr lang="en-US" dirty="0" err="1" smtClean="0"/>
+              <a:rPr lang="en-US" dirty="0"/>
+              <a:t>2. Draw from a random distribution of this type to create a pseudo-dataset. (How many times should you draw?) You can get an estimate of parameters using the “</a:t>
+            </a:r>
+            <a:r>
+              <a:rPr lang="en-US" dirty="0" err="1"/>
               <a:t>fitdistr</a:t>
             </a:r>
             <a:r>
-              <a:rPr lang="en-US" dirty="0" smtClean="0"/>
+              <a:rPr lang="en-US" dirty="0"/>
               <a:t>” function in the MASS package. See example or ?”</a:t>
             </a:r>
             <a:r>
-              <a:rPr lang="en-US" dirty="0" err="1" smtClean="0"/>
+              <a:rPr lang="en-US" dirty="0" err="1"/>
               <a:t>fitdistr</a:t>
             </a:r>
             <a:r>
-              <a:rPr lang="en-US" dirty="0" smtClean="0"/>
+              <a:rPr lang="en-US" dirty="0"/>
               <a:t>”</a:t>
             </a:r>
           </a:p>
@@ -3909,50 +4312,37 @@
             <a:pPr marL="0" indent="0">
               <a:buNone/>
             </a:pPr>
-            <a:endParaRPr lang="en-US" dirty="0" smtClean="0"/>
+            <a:endParaRPr lang="en-US" dirty="0"/>
           </a:p>
           <a:p>
             <a:pPr marL="0" indent="0">
               <a:buNone/>
             </a:pPr>
             <a:r>
-              <a:rPr lang="en-US" dirty="0" smtClean="0"/>
-              <a:t>3</a:t>
-            </a:r>
-            <a:r>
-              <a:rPr lang="en-US" dirty="0" smtClean="0"/>
-              <a:t>. Plot your </a:t>
-            </a:r>
-            <a:r>
-              <a:rPr lang="en-US" dirty="0" smtClean="0"/>
-              <a:t>pseudo-data</a:t>
-            </a:r>
-            <a:r>
-              <a:rPr lang="en-US" dirty="0" smtClean="0"/>
-              <a:t>. Is it exactly the same? Why or why not?</a:t>
+              <a:rPr lang="en-US" dirty="0"/>
+              <a:t>3. Plot your pseudo-data. Is it exactly the same? Why or why not?</a:t>
             </a:r>
           </a:p>
           <a:p>
             <a:pPr marL="0" indent="0">
               <a:buNone/>
             </a:pPr>
-            <a:endParaRPr lang="en-US" dirty="0" smtClean="0"/>
+            <a:endParaRPr lang="en-US" dirty="0"/>
           </a:p>
           <a:p>
             <a:pPr marL="0" indent="0">
               <a:buNone/>
             </a:pPr>
             <a:r>
-              <a:rPr lang="en-US" dirty="0" smtClean="0"/>
+              <a:rPr lang="en-US" dirty="0"/>
               <a:t>4. Using your pseudo-data, ask some reasonable questions about percentiles, and/or probability. What does the output tell you about your question?</a:t>
             </a:r>
+          </a:p>
+          <a:p>
+            <a:pPr marL="0" indent="0">
+              <a:buNone/>
+            </a:pPr>
             <a:endParaRPr lang="en-US" dirty="0"/>
-          </a:p>
-          <a:p>
-            <a:pPr marL="0" indent="0">
-              <a:buNone/>
-            </a:pPr>
-            <a:endParaRPr lang="en-US" dirty="0" smtClean="0"/>
           </a:p>
           <a:p>
             <a:pPr marL="0" indent="0">
@@ -4240,4 +4630,299 @@
     </a:ext>
   </a:extLst>
 </a:theme>
+</file>
+
+<file path=ppt/theme/theme2.xml><?xml version="1.0" encoding="utf-8"?>
+<a:theme xmlns:a="http://schemas.openxmlformats.org/drawingml/2006/main" name="Office Theme">
+  <a:themeElements>
+    <a:clrScheme name="Office">
+      <a:dk1>
+        <a:sysClr val="windowText" lastClr="000000"/>
+      </a:dk1>
+      <a:lt1>
+        <a:sysClr val="window" lastClr="FFFFFF"/>
+      </a:lt1>
+      <a:dk2>
+        <a:srgbClr val="44546A"/>
+      </a:dk2>
+      <a:lt2>
+        <a:srgbClr val="E7E6E6"/>
+      </a:lt2>
+      <a:accent1>
+        <a:srgbClr val="4472C4"/>
+      </a:accent1>
+      <a:accent2>
+        <a:srgbClr val="ED7D31"/>
+      </a:accent2>
+      <a:accent3>
+        <a:srgbClr val="A5A5A5"/>
+      </a:accent3>
+      <a:accent4>
+        <a:srgbClr val="FFC000"/>
+      </a:accent4>
+      <a:accent5>
+        <a:srgbClr val="5B9BD5"/>
+      </a:accent5>
+      <a:accent6>
+        <a:srgbClr val="70AD47"/>
+      </a:accent6>
+      <a:hlink>
+        <a:srgbClr val="0563C1"/>
+      </a:hlink>
+      <a:folHlink>
+        <a:srgbClr val="954F72"/>
+      </a:folHlink>
+    </a:clrScheme>
+    <a:fontScheme name="Office">
+      <a:majorFont>
+        <a:latin typeface="Calibri Light" panose="020F0302020204030204"/>
+        <a:ea typeface=""/>
+        <a:cs typeface=""/>
+        <a:font script="Jpan" typeface="游ゴシック Light"/>
+        <a:font script="Hang" typeface="맑은 고딕"/>
+        <a:font script="Hans" typeface="等线 Light"/>
+        <a:font script="Hant" typeface="新細明體"/>
+        <a:font script="Arab" typeface="Times New Roman"/>
+        <a:font script="Hebr" typeface="Times New Roman"/>
+        <a:font script="Thai" typeface="Angsana New"/>
+        <a:font script="Ethi" typeface="Nyala"/>
+        <a:font script="Beng" typeface="Vrinda"/>
+        <a:font script="Gujr" typeface="Shruti"/>
+        <a:font script="Khmr" typeface="MoolBoran"/>
+        <a:font script="Knda" typeface="Tunga"/>
+        <a:font script="Guru" typeface="Raavi"/>
+        <a:font script="Cans" typeface="Euphemia"/>
+        <a:font script="Cher" typeface="Plantagenet Cherokee"/>
+        <a:font script="Yiii" typeface="Microsoft Yi Baiti"/>
+        <a:font script="Tibt" typeface="Microsoft Himalaya"/>
+        <a:font script="Thaa" typeface="MV Boli"/>
+        <a:font script="Deva" typeface="Mangal"/>
+        <a:font script="Telu" typeface="Gautami"/>
+        <a:font script="Taml" typeface="Latha"/>
+        <a:font script="Syrc" typeface="Estrangelo Edessa"/>
+        <a:font script="Orya" typeface="Kalinga"/>
+        <a:font script="Mlym" typeface="Kartika"/>
+        <a:font script="Laoo" typeface="DokChampa"/>
+        <a:font script="Sinh" typeface="Iskoola Pota"/>
+        <a:font script="Mong" typeface="Mongolian Baiti"/>
+        <a:font script="Viet" typeface="Times New Roman"/>
+        <a:font script="Uigh" typeface="Microsoft Uighur"/>
+        <a:font script="Geor" typeface="Sylfaen"/>
+        <a:font script="Armn" typeface="Arial"/>
+        <a:font script="Bugi" typeface="Leelawadee UI"/>
+        <a:font script="Bopo" typeface="Microsoft JhengHei"/>
+        <a:font script="Java" typeface="Javanese Text"/>
+        <a:font script="Lisu" typeface="Segoe UI"/>
+        <a:font script="Mymr" typeface="Myanmar Text"/>
+        <a:font script="Nkoo" typeface="Ebrima"/>
+        <a:font script="Olck" typeface="Nirmala UI"/>
+        <a:font script="Osma" typeface="Ebrima"/>
+        <a:font script="Phag" typeface="Phagspa"/>
+        <a:font script="Syrn" typeface="Estrangelo Edessa"/>
+        <a:font script="Syrj" typeface="Estrangelo Edessa"/>
+        <a:font script="Syre" typeface="Estrangelo Edessa"/>
+        <a:font script="Sora" typeface="Nirmala UI"/>
+        <a:font script="Tale" typeface="Microsoft Tai Le"/>
+        <a:font script="Talu" typeface="Microsoft New Tai Lue"/>
+        <a:font script="Tfng" typeface="Ebrima"/>
+      </a:majorFont>
+      <a:minorFont>
+        <a:latin typeface="Calibri" panose="020F0502020204030204"/>
+        <a:ea typeface=""/>
+        <a:cs typeface=""/>
+        <a:font script="Jpan" typeface="游ゴシック"/>
+        <a:font script="Hang" typeface="맑은 고딕"/>
+        <a:font script="Hans" typeface="等线"/>
+        <a:font script="Hant" typeface="新細明體"/>
+        <a:font script="Arab" typeface="Arial"/>
+        <a:font script="Hebr" typeface="Arial"/>
+        <a:font script="Thai" typeface="Cordia New"/>
+        <a:font script="Ethi" typeface="Nyala"/>
+        <a:font script="Beng" typeface="Vrinda"/>
+        <a:font script="Gujr" typeface="Shruti"/>
+        <a:font script="Khmr" typeface="DaunPenh"/>
+        <a:font script="Knda" typeface="Tunga"/>
+        <a:font script="Guru" typeface="Raavi"/>
+        <a:font script="Cans" typeface="Euphemia"/>
+        <a:font script="Cher" typeface="Plantagenet Cherokee"/>
+        <a:font script="Yiii" typeface="Microsoft Yi Baiti"/>
+        <a:font script="Tibt" typeface="Microsoft Himalaya"/>
+        <a:font script="Thaa" typeface="MV Boli"/>
+        <a:font script="Deva" typeface="Mangal"/>
+        <a:font script="Telu" typeface="Gautami"/>
+        <a:font script="Taml" typeface="Latha"/>
+        <a:font script="Syrc" typeface="Estrangelo Edessa"/>
+        <a:font script="Orya" typeface="Kalinga"/>
+        <a:font script="Mlym" typeface="Kartika"/>
+        <a:font script="Laoo" typeface="DokChampa"/>
+        <a:font script="Sinh" typeface="Iskoola Pota"/>
+        <a:font script="Mong" typeface="Mongolian Baiti"/>
+        <a:font script="Viet" typeface="Arial"/>
+        <a:font script="Uigh" typeface="Microsoft Uighur"/>
+        <a:font script="Geor" typeface="Sylfaen"/>
+        <a:font script="Armn" typeface="Arial"/>
+        <a:font script="Bugi" typeface="Leelawadee UI"/>
+        <a:font script="Bopo" typeface="Microsoft JhengHei"/>
+        <a:font script="Java" typeface="Javanese Text"/>
+        <a:font script="Lisu" typeface="Segoe UI"/>
+        <a:font script="Mymr" typeface="Myanmar Text"/>
+        <a:font script="Nkoo" typeface="Ebrima"/>
+        <a:font script="Olck" typeface="Nirmala UI"/>
+        <a:font script="Osma" typeface="Ebrima"/>
+        <a:font script="Phag" typeface="Phagspa"/>
+        <a:font script="Syrn" typeface="Estrangelo Edessa"/>
+        <a:font script="Syrj" typeface="Estrangelo Edessa"/>
+        <a:font script="Syre" typeface="Estrangelo Edessa"/>
+        <a:font script="Sora" typeface="Nirmala UI"/>
+        <a:font script="Tale" typeface="Microsoft Tai Le"/>
+        <a:font script="Talu" typeface="Microsoft New Tai Lue"/>
+        <a:font script="Tfng" typeface="Ebrima"/>
+      </a:minorFont>
+    </a:fontScheme>
+    <a:fmtScheme name="Office">
+      <a:fillStyleLst>
+        <a:solidFill>
+          <a:schemeClr val="phClr"/>
+        </a:solidFill>
+        <a:gradFill rotWithShape="1">
+          <a:gsLst>
+            <a:gs pos="0">
+              <a:schemeClr val="phClr">
+                <a:lumMod val="110000"/>
+                <a:satMod val="105000"/>
+                <a:tint val="67000"/>
+              </a:schemeClr>
+            </a:gs>
+            <a:gs pos="50000">
+              <a:schemeClr val="phClr">
+                <a:lumMod val="105000"/>
+                <a:satMod val="103000"/>
+                <a:tint val="73000"/>
+              </a:schemeClr>
+            </a:gs>
+            <a:gs pos="100000">
+              <a:schemeClr val="phClr">
+                <a:lumMod val="105000"/>
+                <a:satMod val="109000"/>
+                <a:tint val="81000"/>
+              </a:schemeClr>
+            </a:gs>
+          </a:gsLst>
+          <a:lin ang="5400000" scaled="0"/>
+        </a:gradFill>
+        <a:gradFill rotWithShape="1">
+          <a:gsLst>
+            <a:gs pos="0">
+              <a:schemeClr val="phClr">
+                <a:satMod val="103000"/>
+                <a:lumMod val="102000"/>
+                <a:tint val="94000"/>
+              </a:schemeClr>
+            </a:gs>
+            <a:gs pos="50000">
+              <a:schemeClr val="phClr">
+                <a:satMod val="110000"/>
+                <a:lumMod val="100000"/>
+                <a:shade val="100000"/>
+              </a:schemeClr>
+            </a:gs>
+            <a:gs pos="100000">
+              <a:schemeClr val="phClr">
+                <a:lumMod val="99000"/>
+                <a:satMod val="120000"/>
+                <a:shade val="78000"/>
+              </a:schemeClr>
+            </a:gs>
+          </a:gsLst>
+          <a:lin ang="5400000" scaled="0"/>
+        </a:gradFill>
+      </a:fillStyleLst>
+      <a:lnStyleLst>
+        <a:ln w="6350" cap="flat" cmpd="sng" algn="ctr">
+          <a:solidFill>
+            <a:schemeClr val="phClr"/>
+          </a:solidFill>
+          <a:prstDash val="solid"/>
+          <a:miter lim="800000"/>
+        </a:ln>
+        <a:ln w="12700" cap="flat" cmpd="sng" algn="ctr">
+          <a:solidFill>
+            <a:schemeClr val="phClr"/>
+          </a:solidFill>
+          <a:prstDash val="solid"/>
+          <a:miter lim="800000"/>
+        </a:ln>
+        <a:ln w="19050" cap="flat" cmpd="sng" algn="ctr">
+          <a:solidFill>
+            <a:schemeClr val="phClr"/>
+          </a:solidFill>
+          <a:prstDash val="solid"/>
+          <a:miter lim="800000"/>
+        </a:ln>
+      </a:lnStyleLst>
+      <a:effectStyleLst>
+        <a:effectStyle>
+          <a:effectLst/>
+        </a:effectStyle>
+        <a:effectStyle>
+          <a:effectLst/>
+        </a:effectStyle>
+        <a:effectStyle>
+          <a:effectLst>
+            <a:outerShdw blurRad="57150" dist="19050" dir="5400000" algn="ctr" rotWithShape="0">
+              <a:srgbClr val="000000">
+                <a:alpha val="63000"/>
+              </a:srgbClr>
+            </a:outerShdw>
+          </a:effectLst>
+        </a:effectStyle>
+      </a:effectStyleLst>
+      <a:bgFillStyleLst>
+        <a:solidFill>
+          <a:schemeClr val="phClr"/>
+        </a:solidFill>
+        <a:solidFill>
+          <a:schemeClr val="phClr">
+            <a:tint val="95000"/>
+            <a:satMod val="170000"/>
+          </a:schemeClr>
+        </a:solidFill>
+        <a:gradFill rotWithShape="1">
+          <a:gsLst>
+            <a:gs pos="0">
+              <a:schemeClr val="phClr">
+                <a:tint val="93000"/>
+                <a:satMod val="150000"/>
+                <a:shade val="98000"/>
+                <a:lumMod val="102000"/>
+              </a:schemeClr>
+            </a:gs>
+            <a:gs pos="50000">
+              <a:schemeClr val="phClr">
+                <a:tint val="98000"/>
+                <a:satMod val="130000"/>
+                <a:shade val="90000"/>
+                <a:lumMod val="103000"/>
+              </a:schemeClr>
+            </a:gs>
+            <a:gs pos="100000">
+              <a:schemeClr val="phClr">
+                <a:shade val="63000"/>
+                <a:satMod val="120000"/>
+              </a:schemeClr>
+            </a:gs>
+          </a:gsLst>
+          <a:lin ang="5400000" scaled="0"/>
+        </a:gradFill>
+      </a:bgFillStyleLst>
+    </a:fmtScheme>
+  </a:themeElements>
+  <a:objectDefaults/>
+  <a:extraClrSchemeLst/>
+  <a:extLst>
+    <a:ext uri="{05A4C25C-085E-4340-85A3-A5531E510DB2}">
+      <thm15:themeFamily xmlns:thm15="http://schemas.microsoft.com/office/thememl/2012/main" name="Office Theme" id="{62F939B6-93AF-4DB8-9C6B-D6C7DFDC589F}" vid="{4A3C46E8-61CC-4603-A589-7422A47A8E4A}"/>
+    </a:ext>
+  </a:extLst>
+</a:theme>
 </file>
</xml_diff>

<commit_message>
sending week 6 materials
</commit_message>
<xml_diff>
--- a/lectures/ex6_rev_distributions.pptx
+++ b/lectures/ex6_rev_distributions.pptx
@@ -201,7 +201,7 @@
           <a:p>
             <a:fld id="{B16F72E9-376B-FB40-B6A5-33EF34EDADFB}" type="datetimeFigureOut">
               <a:rPr lang="en-US" smtClean="0"/>
-              <a:t>2/28/19</a:t>
+              <a:t>2/18/20</a:t>
             </a:fld>
             <a:endParaRPr lang="en-US"/>
           </a:p>
@@ -681,7 +681,7 @@
           <a:p>
             <a:fld id="{3DA3D352-7221-F147-996D-DAA8FC8F9D40}" type="datetimeFigureOut">
               <a:rPr lang="en-US" smtClean="0"/>
-              <a:t>2/28/19</a:t>
+              <a:t>2/18/20</a:t>
             </a:fld>
             <a:endParaRPr lang="en-US"/>
           </a:p>
@@ -849,7 +849,7 @@
           <a:p>
             <a:fld id="{3DA3D352-7221-F147-996D-DAA8FC8F9D40}" type="datetimeFigureOut">
               <a:rPr lang="en-US" smtClean="0"/>
-              <a:t>2/28/19</a:t>
+              <a:t>2/18/20</a:t>
             </a:fld>
             <a:endParaRPr lang="en-US"/>
           </a:p>
@@ -1027,7 +1027,7 @@
           <a:p>
             <a:fld id="{3DA3D352-7221-F147-996D-DAA8FC8F9D40}" type="datetimeFigureOut">
               <a:rPr lang="en-US" smtClean="0"/>
-              <a:t>2/28/19</a:t>
+              <a:t>2/18/20</a:t>
             </a:fld>
             <a:endParaRPr lang="en-US"/>
           </a:p>
@@ -1195,7 +1195,7 @@
           <a:p>
             <a:fld id="{3DA3D352-7221-F147-996D-DAA8FC8F9D40}" type="datetimeFigureOut">
               <a:rPr lang="en-US" smtClean="0"/>
-              <a:t>2/28/19</a:t>
+              <a:t>2/18/20</a:t>
             </a:fld>
             <a:endParaRPr lang="en-US"/>
           </a:p>
@@ -1440,7 +1440,7 @@
           <a:p>
             <a:fld id="{3DA3D352-7221-F147-996D-DAA8FC8F9D40}" type="datetimeFigureOut">
               <a:rPr lang="en-US" smtClean="0"/>
-              <a:t>2/28/19</a:t>
+              <a:t>2/18/20</a:t>
             </a:fld>
             <a:endParaRPr lang="en-US"/>
           </a:p>
@@ -1669,7 +1669,7 @@
           <a:p>
             <a:fld id="{3DA3D352-7221-F147-996D-DAA8FC8F9D40}" type="datetimeFigureOut">
               <a:rPr lang="en-US" smtClean="0"/>
-              <a:t>2/28/19</a:t>
+              <a:t>2/18/20</a:t>
             </a:fld>
             <a:endParaRPr lang="en-US"/>
           </a:p>
@@ -2033,7 +2033,7 @@
           <a:p>
             <a:fld id="{3DA3D352-7221-F147-996D-DAA8FC8F9D40}" type="datetimeFigureOut">
               <a:rPr lang="en-US" smtClean="0"/>
-              <a:t>2/28/19</a:t>
+              <a:t>2/18/20</a:t>
             </a:fld>
             <a:endParaRPr lang="en-US"/>
           </a:p>
@@ -2150,7 +2150,7 @@
           <a:p>
             <a:fld id="{3DA3D352-7221-F147-996D-DAA8FC8F9D40}" type="datetimeFigureOut">
               <a:rPr lang="en-US" smtClean="0"/>
-              <a:t>2/28/19</a:t>
+              <a:t>2/18/20</a:t>
             </a:fld>
             <a:endParaRPr lang="en-US"/>
           </a:p>
@@ -2245,7 +2245,7 @@
           <a:p>
             <a:fld id="{3DA3D352-7221-F147-996D-DAA8FC8F9D40}" type="datetimeFigureOut">
               <a:rPr lang="en-US" smtClean="0"/>
-              <a:t>2/28/19</a:t>
+              <a:t>2/18/20</a:t>
             </a:fld>
             <a:endParaRPr lang="en-US"/>
           </a:p>
@@ -2520,7 +2520,7 @@
           <a:p>
             <a:fld id="{3DA3D352-7221-F147-996D-DAA8FC8F9D40}" type="datetimeFigureOut">
               <a:rPr lang="en-US" smtClean="0"/>
-              <a:t>2/28/19</a:t>
+              <a:t>2/18/20</a:t>
             </a:fld>
             <a:endParaRPr lang="en-US"/>
           </a:p>
@@ -2772,7 +2772,7 @@
           <a:p>
             <a:fld id="{3DA3D352-7221-F147-996D-DAA8FC8F9D40}" type="datetimeFigureOut">
               <a:rPr lang="en-US" smtClean="0"/>
-              <a:t>2/28/19</a:t>
+              <a:t>2/18/20</a:t>
             </a:fld>
             <a:endParaRPr lang="en-US"/>
           </a:p>
@@ -2983,7 +2983,7 @@
           <a:p>
             <a:fld id="{3DA3D352-7221-F147-996D-DAA8FC8F9D40}" type="datetimeFigureOut">
               <a:rPr lang="en-US" smtClean="0"/>
-              <a:t>2/28/19</a:t>
+              <a:t>2/18/20</a:t>
             </a:fld>
             <a:endParaRPr lang="en-US"/>
           </a:p>
@@ -3916,7 +3916,7 @@
           <a:p>
             <a:r>
               <a:rPr lang="en-US" dirty="0"/>
-              <a:t>If there are 1000 seeds in a seedbank and each seed has a 2% chance of being eaten and a 1% probability of sprouting each day, how many seedlings would we expect to see sprouting each day? Over 100 days?</a:t>
+              <a:t>If there are 1000 seeds in a seedbank and each seed has a 2% chance of being eaten and a 1% probability of sprouting each day, how many seedlings would we expect to see sprouting each day</a:t>
             </a:r>
           </a:p>
           <a:p>
@@ -4006,77 +4006,6 @@
           </a:p>
           <a:p>
             <a:pPr lvl="1"/>
-            <a:r>
-              <a:rPr lang="mr-IN" dirty="0"/>
-              <a:t>#100 </a:t>
-            </a:r>
-            <a:r>
-              <a:rPr lang="mr-IN" dirty="0" err="1"/>
-              <a:t>day</a:t>
-            </a:r>
-            <a:r>
-              <a:rPr lang="en-US" dirty="0"/>
-              <a:t>s</a:t>
-            </a:r>
-          </a:p>
-          <a:p>
-            <a:pPr lvl="2"/>
-            <a:r>
-              <a:rPr lang="mr-IN" dirty="0" err="1"/>
-              <a:t>sum</a:t>
-            </a:r>
-            <a:r>
-              <a:rPr lang="mr-IN" dirty="0"/>
-              <a:t>(</a:t>
-            </a:r>
-            <a:r>
-              <a:rPr lang="mr-IN" dirty="0" err="1"/>
-              <a:t>rbinom</a:t>
-            </a:r>
-            <a:r>
-              <a:rPr lang="mr-IN" dirty="0"/>
-              <a:t>(</a:t>
-            </a:r>
-            <a:r>
-              <a:rPr lang="mr-IN" dirty="0" err="1"/>
-              <a:t>n</a:t>
-            </a:r>
-            <a:r>
-              <a:rPr lang="mr-IN" dirty="0"/>
-              <a:t> = </a:t>
-            </a:r>
-            <a:r>
-              <a:rPr lang="mr-IN" dirty="0" err="1"/>
-              <a:t>sum</a:t>
-            </a:r>
-            <a:r>
-              <a:rPr lang="mr-IN" dirty="0"/>
-              <a:t>(</a:t>
-            </a:r>
-            <a:r>
-              <a:rPr lang="mr-IN" dirty="0" err="1"/>
-              <a:t>rbinom</a:t>
-            </a:r>
-            <a:r>
-              <a:rPr lang="mr-IN" dirty="0"/>
-              <a:t>(1000,size=1,p = .98)),</a:t>
-            </a:r>
-            <a:r>
-              <a:rPr lang="mr-IN" dirty="0" err="1"/>
-              <a:t>size</a:t>
-            </a:r>
-            <a:r>
-              <a:rPr lang="mr-IN" dirty="0"/>
-              <a:t>=100, </a:t>
-            </a:r>
-            <a:r>
-              <a:rPr lang="mr-IN" dirty="0" err="1"/>
-              <a:t>p</a:t>
-            </a:r>
-            <a:r>
-              <a:rPr lang="mr-IN" dirty="0"/>
-              <a:t>=.01 ))</a:t>
-            </a:r>
             <a:br>
               <a:rPr lang="en-US" dirty="0"/>
             </a:br>

</xml_diff>